<commit_message>
Updates the demo slides
</commit_message>
<xml_diff>
--- a/docs/Web App Testing Automation.pptx
+++ b/docs/Web App Testing Automation.pptx
@@ -18,10 +18,6 @@
     <p:sldId id="263" r:id="rId13"/>
     <p:sldId id="264" r:id="rId14"/>
     <p:sldId id="265" r:id="rId15"/>
-    <p:sldId id="266" r:id="rId16"/>
-    <p:sldId id="267" r:id="rId17"/>
-    <p:sldId id="268" r:id="rId18"/>
-    <p:sldId id="269" r:id="rId19"/>
   </p:sldIdLst>
   <p:sldSz cy="5143500" cx="9144000"/>
   <p:notesSz cx="6858000" cy="9144000"/>
@@ -803,7 +799,7 @@
   <p:cSld>
     <p:spTree>
       <p:nvGrpSpPr>
-        <p:cNvPr id="104" name="Shape 104"/>
+        <p:cNvPr id="105" name="Shape 105"/>
         <p:cNvGrpSpPr/>
         <p:nvPr/>
       </p:nvGrpSpPr>
@@ -817,7 +813,7 @@
       </p:grpSpPr>
       <p:sp>
         <p:nvSpPr>
-          <p:cNvPr id="105" name="Google Shape;105;g264f914ed1a_0_86:notes"/>
+          <p:cNvPr id="106" name="Google Shape;106;g264f914ed1a_0_117:notes"/>
           <p:cNvSpPr/>
           <p:nvPr>
             <p:ph idx="2" type="sldImg"/>
@@ -852,403 +848,7 @@
       </p:sp>
       <p:sp>
         <p:nvSpPr>
-          <p:cNvPr id="106" name="Google Shape;106;g264f914ed1a_0_86:notes"/>
-          <p:cNvSpPr txBox="1"/>
-          <p:nvPr>
-            <p:ph idx="1" type="body"/>
-          </p:nvPr>
-        </p:nvSpPr>
-        <p:spPr>
-          <a:xfrm>
-            <a:off x="685800" y="4343400"/>
-            <a:ext cx="5486400" cy="4114800"/>
-          </a:xfrm>
-          <a:prstGeom prst="rect">
-            <a:avLst/>
-          </a:prstGeom>
-        </p:spPr>
-        <p:txBody>
-          <a:bodyPr anchorCtr="0" anchor="t" bIns="91425" lIns="91425" spcFirstLastPara="1" rIns="91425" wrap="square" tIns="91425">
-            <a:noAutofit/>
-          </a:bodyPr>
-          <a:lstStyle/>
-          <a:p>
-            <a:pPr indent="0" lvl="0" marL="0" rtl="0" algn="l">
-              <a:spcBef>
-                <a:spcPts val="0"/>
-              </a:spcBef>
-              <a:spcAft>
-                <a:spcPts val="0"/>
-              </a:spcAft>
-              <a:buNone/>
-            </a:pPr>
-            <a:r>
-              <a:t/>
-            </a:r>
-            <a:endParaRPr/>
-          </a:p>
-        </p:txBody>
-      </p:sp>
-    </p:spTree>
-  </p:cSld>
-  <p:clrMapOvr>
-    <a:masterClrMapping/>
-  </p:clrMapOvr>
-</p:notes>
-</file>
-
-<file path=ppt/notesSlides/notesSlide11.xml><?xml version="1.0" encoding="utf-8"?>
-<p:notes xmlns:a="http://schemas.openxmlformats.org/drawingml/2006/main" xmlns:r="http://schemas.openxmlformats.org/officeDocument/2006/relationships" xmlns:mc="http://schemas.openxmlformats.org/markup-compatibility/2006" xmlns:mv="urn:schemas-microsoft-com:mac:vml" xmlns:p="http://schemas.openxmlformats.org/presentationml/2006/main" xmlns:c="http://schemas.openxmlformats.org/drawingml/2006/chart" xmlns:dgm="http://schemas.openxmlformats.org/drawingml/2006/diagram" xmlns:o="urn:schemas-microsoft-com:office:office" xmlns:v="urn:schemas-microsoft-com:vml" xmlns:pvml="urn:schemas-microsoft-com:office:powerpoint" xmlns:com="http://schemas.openxmlformats.org/drawingml/2006/compatibility" xmlns:p14="http://schemas.microsoft.com/office/powerpoint/2010/main" xmlns:p15="http://schemas.microsoft.com/office/powerpoint/2012/main" xmlns:ahyp="http://schemas.microsoft.com/office/drawing/2018/hyperlinkcolor" showMasterPhAnim="0" showMasterSp="0">
-  <p:cSld>
-    <p:spTree>
-      <p:nvGrpSpPr>
-        <p:cNvPr id="110" name="Shape 110"/>
-        <p:cNvGrpSpPr/>
-        <p:nvPr/>
-      </p:nvGrpSpPr>
-      <p:grpSpPr>
-        <a:xfrm>
-          <a:off x="0" y="0"/>
-          <a:ext cx="0" cy="0"/>
-          <a:chOff x="0" y="0"/>
-          <a:chExt cx="0" cy="0"/>
-        </a:xfrm>
-      </p:grpSpPr>
-      <p:sp>
-        <p:nvSpPr>
-          <p:cNvPr id="111" name="Google Shape;111;g264f914ed1a_0_91:notes"/>
-          <p:cNvSpPr/>
-          <p:nvPr>
-            <p:ph idx="2" type="sldImg"/>
-          </p:nvPr>
-        </p:nvSpPr>
-        <p:spPr>
-          <a:xfrm>
-            <a:off x="381300" y="685800"/>
-            <a:ext cx="6096000" cy="3429000"/>
-          </a:xfrm>
-          <a:custGeom>
-            <a:rect b="b" l="l" r="r" t="t"/>
-            <a:pathLst>
-              <a:path extrusionOk="0" h="120000" w="120000">
-                <a:moveTo>
-                  <a:pt x="0" y="0"/>
-                </a:moveTo>
-                <a:lnTo>
-                  <a:pt x="120000" y="0"/>
-                </a:lnTo>
-                <a:lnTo>
-                  <a:pt x="120000" y="120000"/>
-                </a:lnTo>
-                <a:lnTo>
-                  <a:pt x="0" y="120000"/>
-                </a:lnTo>
-                <a:close/>
-              </a:path>
-            </a:pathLst>
-          </a:custGeom>
-        </p:spPr>
-      </p:sp>
-      <p:sp>
-        <p:nvSpPr>
-          <p:cNvPr id="112" name="Google Shape;112;g264f914ed1a_0_91:notes"/>
-          <p:cNvSpPr txBox="1"/>
-          <p:nvPr>
-            <p:ph idx="1" type="body"/>
-          </p:nvPr>
-        </p:nvSpPr>
-        <p:spPr>
-          <a:xfrm>
-            <a:off x="685800" y="4343400"/>
-            <a:ext cx="5486400" cy="4114800"/>
-          </a:xfrm>
-          <a:prstGeom prst="rect">
-            <a:avLst/>
-          </a:prstGeom>
-        </p:spPr>
-        <p:txBody>
-          <a:bodyPr anchorCtr="0" anchor="t" bIns="91425" lIns="91425" spcFirstLastPara="1" rIns="91425" wrap="square" tIns="91425">
-            <a:noAutofit/>
-          </a:bodyPr>
-          <a:lstStyle/>
-          <a:p>
-            <a:pPr indent="0" lvl="0" marL="0" rtl="0" algn="l">
-              <a:spcBef>
-                <a:spcPts val="0"/>
-              </a:spcBef>
-              <a:spcAft>
-                <a:spcPts val="0"/>
-              </a:spcAft>
-              <a:buNone/>
-            </a:pPr>
-            <a:r>
-              <a:t/>
-            </a:r>
-            <a:endParaRPr/>
-          </a:p>
-        </p:txBody>
-      </p:sp>
-    </p:spTree>
-  </p:cSld>
-  <p:clrMapOvr>
-    <a:masterClrMapping/>
-  </p:clrMapOvr>
-</p:notes>
-</file>
-
-<file path=ppt/notesSlides/notesSlide12.xml><?xml version="1.0" encoding="utf-8"?>
-<p:notes xmlns:a="http://schemas.openxmlformats.org/drawingml/2006/main" xmlns:r="http://schemas.openxmlformats.org/officeDocument/2006/relationships" xmlns:mc="http://schemas.openxmlformats.org/markup-compatibility/2006" xmlns:mv="urn:schemas-microsoft-com:mac:vml" xmlns:p="http://schemas.openxmlformats.org/presentationml/2006/main" xmlns:c="http://schemas.openxmlformats.org/drawingml/2006/chart" xmlns:dgm="http://schemas.openxmlformats.org/drawingml/2006/diagram" xmlns:o="urn:schemas-microsoft-com:office:office" xmlns:v="urn:schemas-microsoft-com:vml" xmlns:pvml="urn:schemas-microsoft-com:office:powerpoint" xmlns:com="http://schemas.openxmlformats.org/drawingml/2006/compatibility" xmlns:p14="http://schemas.microsoft.com/office/powerpoint/2010/main" xmlns:p15="http://schemas.microsoft.com/office/powerpoint/2012/main" xmlns:ahyp="http://schemas.microsoft.com/office/drawing/2018/hyperlinkcolor" showMasterPhAnim="0" showMasterSp="0">
-  <p:cSld>
-    <p:spTree>
-      <p:nvGrpSpPr>
-        <p:cNvPr id="116" name="Shape 116"/>
-        <p:cNvGrpSpPr/>
-        <p:nvPr/>
-      </p:nvGrpSpPr>
-      <p:grpSpPr>
-        <a:xfrm>
-          <a:off x="0" y="0"/>
-          <a:ext cx="0" cy="0"/>
-          <a:chOff x="0" y="0"/>
-          <a:chExt cx="0" cy="0"/>
-        </a:xfrm>
-      </p:grpSpPr>
-      <p:sp>
-        <p:nvSpPr>
-          <p:cNvPr id="117" name="Google Shape;117;g264f914ed1a_0_100:notes"/>
-          <p:cNvSpPr/>
-          <p:nvPr>
-            <p:ph idx="2" type="sldImg"/>
-          </p:nvPr>
-        </p:nvSpPr>
-        <p:spPr>
-          <a:xfrm>
-            <a:off x="381300" y="685800"/>
-            <a:ext cx="6096000" cy="3429000"/>
-          </a:xfrm>
-          <a:custGeom>
-            <a:rect b="b" l="l" r="r" t="t"/>
-            <a:pathLst>
-              <a:path extrusionOk="0" h="120000" w="120000">
-                <a:moveTo>
-                  <a:pt x="0" y="0"/>
-                </a:moveTo>
-                <a:lnTo>
-                  <a:pt x="120000" y="0"/>
-                </a:lnTo>
-                <a:lnTo>
-                  <a:pt x="120000" y="120000"/>
-                </a:lnTo>
-                <a:lnTo>
-                  <a:pt x="0" y="120000"/>
-                </a:lnTo>
-                <a:close/>
-              </a:path>
-            </a:pathLst>
-          </a:custGeom>
-        </p:spPr>
-      </p:sp>
-      <p:sp>
-        <p:nvSpPr>
-          <p:cNvPr id="118" name="Google Shape;118;g264f914ed1a_0_100:notes"/>
-          <p:cNvSpPr txBox="1"/>
-          <p:nvPr>
-            <p:ph idx="1" type="body"/>
-          </p:nvPr>
-        </p:nvSpPr>
-        <p:spPr>
-          <a:xfrm>
-            <a:off x="685800" y="4343400"/>
-            <a:ext cx="5486400" cy="4114800"/>
-          </a:xfrm>
-          <a:prstGeom prst="rect">
-            <a:avLst/>
-          </a:prstGeom>
-        </p:spPr>
-        <p:txBody>
-          <a:bodyPr anchorCtr="0" anchor="t" bIns="91425" lIns="91425" spcFirstLastPara="1" rIns="91425" wrap="square" tIns="91425">
-            <a:noAutofit/>
-          </a:bodyPr>
-          <a:lstStyle/>
-          <a:p>
-            <a:pPr indent="0" lvl="0" marL="0" rtl="0" algn="l">
-              <a:spcBef>
-                <a:spcPts val="0"/>
-              </a:spcBef>
-              <a:spcAft>
-                <a:spcPts val="0"/>
-              </a:spcAft>
-              <a:buNone/>
-            </a:pPr>
-            <a:r>
-              <a:t/>
-            </a:r>
-            <a:endParaRPr/>
-          </a:p>
-        </p:txBody>
-      </p:sp>
-    </p:spTree>
-  </p:cSld>
-  <p:clrMapOvr>
-    <a:masterClrMapping/>
-  </p:clrMapOvr>
-</p:notes>
-</file>
-
-<file path=ppt/notesSlides/notesSlide13.xml><?xml version="1.0" encoding="utf-8"?>
-<p:notes xmlns:a="http://schemas.openxmlformats.org/drawingml/2006/main" xmlns:r="http://schemas.openxmlformats.org/officeDocument/2006/relationships" xmlns:mc="http://schemas.openxmlformats.org/markup-compatibility/2006" xmlns:mv="urn:schemas-microsoft-com:mac:vml" xmlns:p="http://schemas.openxmlformats.org/presentationml/2006/main" xmlns:c="http://schemas.openxmlformats.org/drawingml/2006/chart" xmlns:dgm="http://schemas.openxmlformats.org/drawingml/2006/diagram" xmlns:o="urn:schemas-microsoft-com:office:office" xmlns:v="urn:schemas-microsoft-com:vml" xmlns:pvml="urn:schemas-microsoft-com:office:powerpoint" xmlns:com="http://schemas.openxmlformats.org/drawingml/2006/compatibility" xmlns:p14="http://schemas.microsoft.com/office/powerpoint/2010/main" xmlns:p15="http://schemas.microsoft.com/office/powerpoint/2012/main" xmlns:ahyp="http://schemas.microsoft.com/office/drawing/2018/hyperlinkcolor" showMasterPhAnim="0" showMasterSp="0">
-  <p:cSld>
-    <p:spTree>
-      <p:nvGrpSpPr>
-        <p:cNvPr id="122" name="Shape 122"/>
-        <p:cNvGrpSpPr/>
-        <p:nvPr/>
-      </p:nvGrpSpPr>
-      <p:grpSpPr>
-        <a:xfrm>
-          <a:off x="0" y="0"/>
-          <a:ext cx="0" cy="0"/>
-          <a:chOff x="0" y="0"/>
-          <a:chExt cx="0" cy="0"/>
-        </a:xfrm>
-      </p:grpSpPr>
-      <p:sp>
-        <p:nvSpPr>
-          <p:cNvPr id="123" name="Google Shape;123;g264f914ed1a_0_109:notes"/>
-          <p:cNvSpPr/>
-          <p:nvPr>
-            <p:ph idx="2" type="sldImg"/>
-          </p:nvPr>
-        </p:nvSpPr>
-        <p:spPr>
-          <a:xfrm>
-            <a:off x="381300" y="685800"/>
-            <a:ext cx="6096000" cy="3429000"/>
-          </a:xfrm>
-          <a:custGeom>
-            <a:rect b="b" l="l" r="r" t="t"/>
-            <a:pathLst>
-              <a:path extrusionOk="0" h="120000" w="120000">
-                <a:moveTo>
-                  <a:pt x="0" y="0"/>
-                </a:moveTo>
-                <a:lnTo>
-                  <a:pt x="120000" y="0"/>
-                </a:lnTo>
-                <a:lnTo>
-                  <a:pt x="120000" y="120000"/>
-                </a:lnTo>
-                <a:lnTo>
-                  <a:pt x="0" y="120000"/>
-                </a:lnTo>
-                <a:close/>
-              </a:path>
-            </a:pathLst>
-          </a:custGeom>
-        </p:spPr>
-      </p:sp>
-      <p:sp>
-        <p:nvSpPr>
-          <p:cNvPr id="124" name="Google Shape;124;g264f914ed1a_0_109:notes"/>
-          <p:cNvSpPr txBox="1"/>
-          <p:nvPr>
-            <p:ph idx="1" type="body"/>
-          </p:nvPr>
-        </p:nvSpPr>
-        <p:spPr>
-          <a:xfrm>
-            <a:off x="685800" y="4343400"/>
-            <a:ext cx="5486400" cy="4114800"/>
-          </a:xfrm>
-          <a:prstGeom prst="rect">
-            <a:avLst/>
-          </a:prstGeom>
-        </p:spPr>
-        <p:txBody>
-          <a:bodyPr anchorCtr="0" anchor="t" bIns="91425" lIns="91425" spcFirstLastPara="1" rIns="91425" wrap="square" tIns="91425">
-            <a:noAutofit/>
-          </a:bodyPr>
-          <a:lstStyle/>
-          <a:p>
-            <a:pPr indent="0" lvl="0" marL="0" rtl="0" algn="l">
-              <a:spcBef>
-                <a:spcPts val="0"/>
-              </a:spcBef>
-              <a:spcAft>
-                <a:spcPts val="0"/>
-              </a:spcAft>
-              <a:buNone/>
-            </a:pPr>
-            <a:r>
-              <a:t/>
-            </a:r>
-            <a:endParaRPr/>
-          </a:p>
-        </p:txBody>
-      </p:sp>
-    </p:spTree>
-  </p:cSld>
-  <p:clrMapOvr>
-    <a:masterClrMapping/>
-  </p:clrMapOvr>
-</p:notes>
-</file>
-
-<file path=ppt/notesSlides/notesSlide14.xml><?xml version="1.0" encoding="utf-8"?>
-<p:notes xmlns:a="http://schemas.openxmlformats.org/drawingml/2006/main" xmlns:r="http://schemas.openxmlformats.org/officeDocument/2006/relationships" xmlns:mc="http://schemas.openxmlformats.org/markup-compatibility/2006" xmlns:mv="urn:schemas-microsoft-com:mac:vml" xmlns:p="http://schemas.openxmlformats.org/presentationml/2006/main" xmlns:c="http://schemas.openxmlformats.org/drawingml/2006/chart" xmlns:dgm="http://schemas.openxmlformats.org/drawingml/2006/diagram" xmlns:o="urn:schemas-microsoft-com:office:office" xmlns:v="urn:schemas-microsoft-com:vml" xmlns:pvml="urn:schemas-microsoft-com:office:powerpoint" xmlns:com="http://schemas.openxmlformats.org/drawingml/2006/compatibility" xmlns:p14="http://schemas.microsoft.com/office/powerpoint/2010/main" xmlns:p15="http://schemas.microsoft.com/office/powerpoint/2012/main" xmlns:ahyp="http://schemas.microsoft.com/office/drawing/2018/hyperlinkcolor" showMasterPhAnim="0" showMasterSp="0">
-  <p:cSld>
-    <p:spTree>
-      <p:nvGrpSpPr>
-        <p:cNvPr id="128" name="Shape 128"/>
-        <p:cNvGrpSpPr/>
-        <p:nvPr/>
-      </p:nvGrpSpPr>
-      <p:grpSpPr>
-        <a:xfrm>
-          <a:off x="0" y="0"/>
-          <a:ext cx="0" cy="0"/>
-          <a:chOff x="0" y="0"/>
-          <a:chExt cx="0" cy="0"/>
-        </a:xfrm>
-      </p:grpSpPr>
-      <p:sp>
-        <p:nvSpPr>
-          <p:cNvPr id="129" name="Google Shape;129;g264f914ed1a_0_117:notes"/>
-          <p:cNvSpPr/>
-          <p:nvPr>
-            <p:ph idx="2" type="sldImg"/>
-          </p:nvPr>
-        </p:nvSpPr>
-        <p:spPr>
-          <a:xfrm>
-            <a:off x="381300" y="685800"/>
-            <a:ext cx="6096000" cy="3429000"/>
-          </a:xfrm>
-          <a:custGeom>
-            <a:rect b="b" l="l" r="r" t="t"/>
-            <a:pathLst>
-              <a:path extrusionOk="0" h="120000" w="120000">
-                <a:moveTo>
-                  <a:pt x="0" y="0"/>
-                </a:moveTo>
-                <a:lnTo>
-                  <a:pt x="120000" y="0"/>
-                </a:lnTo>
-                <a:lnTo>
-                  <a:pt x="120000" y="120000"/>
-                </a:lnTo>
-                <a:lnTo>
-                  <a:pt x="0" y="120000"/>
-                </a:lnTo>
-                <a:close/>
-              </a:path>
-            </a:pathLst>
-          </a:custGeom>
-        </p:spPr>
-      </p:sp>
-      <p:sp>
-        <p:nvSpPr>
-          <p:cNvPr id="130" name="Google Shape;130;g264f914ed1a_0_117:notes"/>
+          <p:cNvPr id="107" name="Google Shape;107;g264f914ed1a_0_117:notes"/>
           <p:cNvSpPr txBox="1"/>
           <p:nvPr>
             <p:ph idx="1" type="body"/>
@@ -1397,7 +997,7 @@
   <p:cSld>
     <p:spTree>
       <p:nvGrpSpPr>
-        <p:cNvPr id="62" name="Shape 62"/>
+        <p:cNvPr id="63" name="Shape 63"/>
         <p:cNvGrpSpPr/>
         <p:nvPr/>
       </p:nvGrpSpPr>
@@ -1411,7 +1011,7 @@
       </p:grpSpPr>
       <p:sp>
         <p:nvSpPr>
-          <p:cNvPr id="63" name="Google Shape;63;g264f914ed1a_0_22:notes"/>
+          <p:cNvPr id="64" name="Google Shape;64;g264f914ed1a_0_22:notes"/>
           <p:cNvSpPr/>
           <p:nvPr>
             <p:ph idx="2" type="sldImg"/>
@@ -1446,7 +1046,7 @@
       </p:sp>
       <p:sp>
         <p:nvSpPr>
-          <p:cNvPr id="64" name="Google Shape;64;g264f914ed1a_0_22:notes"/>
+          <p:cNvPr id="65" name="Google Shape;65;g264f914ed1a_0_22:notes"/>
           <p:cNvSpPr txBox="1"/>
           <p:nvPr>
             <p:ph idx="1" type="body"/>
@@ -1496,7 +1096,7 @@
   <p:cSld>
     <p:spTree>
       <p:nvGrpSpPr>
-        <p:cNvPr id="68" name="Shape 68"/>
+        <p:cNvPr id="69" name="Shape 69"/>
         <p:cNvGrpSpPr/>
         <p:nvPr/>
       </p:nvGrpSpPr>
@@ -1510,7 +1110,7 @@
       </p:grpSpPr>
       <p:sp>
         <p:nvSpPr>
-          <p:cNvPr id="69" name="Google Shape;69;g264f914ed1a_0_42:notes"/>
+          <p:cNvPr id="70" name="Google Shape;70;g264f914ed1a_0_42:notes"/>
           <p:cNvSpPr/>
           <p:nvPr>
             <p:ph idx="2" type="sldImg"/>
@@ -1545,7 +1145,7 @@
       </p:sp>
       <p:sp>
         <p:nvSpPr>
-          <p:cNvPr id="70" name="Google Shape;70;g264f914ed1a_0_42:notes"/>
+          <p:cNvPr id="71" name="Google Shape;71;g264f914ed1a_0_42:notes"/>
           <p:cNvSpPr txBox="1"/>
           <p:nvPr>
             <p:ph idx="1" type="body"/>
@@ -1595,7 +1195,7 @@
   <p:cSld>
     <p:spTree>
       <p:nvGrpSpPr>
-        <p:cNvPr id="74" name="Shape 74"/>
+        <p:cNvPr id="75" name="Shape 75"/>
         <p:cNvGrpSpPr/>
         <p:nvPr/>
       </p:nvGrpSpPr>
@@ -1609,7 +1209,7 @@
       </p:grpSpPr>
       <p:sp>
         <p:nvSpPr>
-          <p:cNvPr id="75" name="Google Shape;75;g264f914ed1a_0_49:notes"/>
+          <p:cNvPr id="76" name="Google Shape;76;g264f914ed1a_0_100:notes"/>
           <p:cNvSpPr/>
           <p:nvPr>
             <p:ph idx="2" type="sldImg"/>
@@ -1644,7 +1244,7 @@
       </p:sp>
       <p:sp>
         <p:nvSpPr>
-          <p:cNvPr id="76" name="Google Shape;76;g264f914ed1a_0_49:notes"/>
+          <p:cNvPr id="77" name="Google Shape;77;g264f914ed1a_0_100:notes"/>
           <p:cNvSpPr txBox="1"/>
           <p:nvPr>
             <p:ph idx="1" type="body"/>
@@ -1694,7 +1294,7 @@
   <p:cSld>
     <p:spTree>
       <p:nvGrpSpPr>
-        <p:cNvPr id="80" name="Shape 80"/>
+        <p:cNvPr id="81" name="Shape 81"/>
         <p:cNvGrpSpPr/>
         <p:nvPr/>
       </p:nvGrpSpPr>
@@ -1708,7 +1308,7 @@
       </p:grpSpPr>
       <p:sp>
         <p:nvSpPr>
-          <p:cNvPr id="81" name="Google Shape;81;g264f914ed1a_0_63:notes"/>
+          <p:cNvPr id="82" name="Google Shape;82;g2abcc546b85_0_13:notes"/>
           <p:cNvSpPr/>
           <p:nvPr>
             <p:ph idx="2" type="sldImg"/>
@@ -1743,7 +1343,7 @@
       </p:sp>
       <p:sp>
         <p:nvSpPr>
-          <p:cNvPr id="82" name="Google Shape;82;g264f914ed1a_0_63:notes"/>
+          <p:cNvPr id="83" name="Google Shape;83;g2abcc546b85_0_13:notes"/>
           <p:cNvSpPr txBox="1"/>
           <p:nvPr>
             <p:ph idx="1" type="body"/>
@@ -1793,7 +1393,7 @@
   <p:cSld>
     <p:spTree>
       <p:nvGrpSpPr>
-        <p:cNvPr id="86" name="Shape 86"/>
+        <p:cNvPr id="87" name="Shape 87"/>
         <p:cNvGrpSpPr/>
         <p:nvPr/>
       </p:nvGrpSpPr>
@@ -1807,7 +1407,7 @@
       </p:grpSpPr>
       <p:sp>
         <p:nvSpPr>
-          <p:cNvPr id="87" name="Google Shape;87;g264f914ed1a_0_54:notes"/>
+          <p:cNvPr id="88" name="Google Shape;88;g2abcc546b85_0_20:notes"/>
           <p:cNvSpPr/>
           <p:nvPr>
             <p:ph idx="2" type="sldImg"/>
@@ -1842,7 +1442,7 @@
       </p:sp>
       <p:sp>
         <p:nvSpPr>
-          <p:cNvPr id="88" name="Google Shape;88;g264f914ed1a_0_54:notes"/>
+          <p:cNvPr id="89" name="Google Shape;89;g2abcc546b85_0_20:notes"/>
           <p:cNvSpPr txBox="1"/>
           <p:nvPr>
             <p:ph idx="1" type="body"/>
@@ -1892,7 +1492,7 @@
   <p:cSld>
     <p:spTree>
       <p:nvGrpSpPr>
-        <p:cNvPr id="92" name="Shape 92"/>
+        <p:cNvPr id="93" name="Shape 93"/>
         <p:cNvGrpSpPr/>
         <p:nvPr/>
       </p:nvGrpSpPr>
@@ -1906,7 +1506,7 @@
       </p:grpSpPr>
       <p:sp>
         <p:nvSpPr>
-          <p:cNvPr id="93" name="Google Shape;93;g264f914ed1a_0_69:notes"/>
+          <p:cNvPr id="94" name="Google Shape;94;g264f914ed1a_0_109:notes"/>
           <p:cNvSpPr/>
           <p:nvPr>
             <p:ph idx="2" type="sldImg"/>
@@ -1941,7 +1541,7 @@
       </p:sp>
       <p:sp>
         <p:nvSpPr>
-          <p:cNvPr id="94" name="Google Shape;94;g264f914ed1a_0_69:notes"/>
+          <p:cNvPr id="95" name="Google Shape;95;g264f914ed1a_0_109:notes"/>
           <p:cNvSpPr txBox="1"/>
           <p:nvPr>
             <p:ph idx="1" type="body"/>
@@ -1991,7 +1591,7 @@
   <p:cSld>
     <p:spTree>
       <p:nvGrpSpPr>
-        <p:cNvPr id="98" name="Shape 98"/>
+        <p:cNvPr id="99" name="Shape 99"/>
         <p:cNvGrpSpPr/>
         <p:nvPr/>
       </p:nvGrpSpPr>
@@ -2005,7 +1605,7 @@
       </p:grpSpPr>
       <p:sp>
         <p:nvSpPr>
-          <p:cNvPr id="99" name="Google Shape;99;g264f914ed1a_0_79:notes"/>
+          <p:cNvPr id="100" name="Google Shape;100;g2abcc546b85_0_25:notes"/>
           <p:cNvSpPr/>
           <p:nvPr>
             <p:ph idx="2" type="sldImg"/>
@@ -2040,7 +1640,7 @@
       </p:sp>
       <p:sp>
         <p:nvSpPr>
-          <p:cNvPr id="100" name="Google Shape;100;g264f914ed1a_0_79:notes"/>
+          <p:cNvPr id="101" name="Google Shape;101;g2abcc546b85_0_25:notes"/>
           <p:cNvSpPr txBox="1"/>
           <p:nvPr>
             <p:ph idx="1" type="body"/>
@@ -6844,7 +6444,7 @@
   <p:cSld>
     <p:spTree>
       <p:nvGrpSpPr>
-        <p:cNvPr id="107" name="Shape 107"/>
+        <p:cNvPr id="108" name="Shape 108"/>
         <p:cNvGrpSpPr/>
         <p:nvPr/>
       </p:nvGrpSpPr>
@@ -6858,7 +6458,7 @@
       </p:grpSpPr>
       <p:sp>
         <p:nvSpPr>
-          <p:cNvPr id="108" name="Google Shape;108;p22"/>
+          <p:cNvPr id="109" name="Google Shape;109;p22"/>
           <p:cNvSpPr txBox="1"/>
           <p:nvPr>
             <p:ph type="title"/>
@@ -6890,7 +6490,7 @@
             </a:pPr>
             <a:r>
               <a:rPr lang="en"/>
-              <a:t>[Slide 5: Code Files Overview]</a:t>
+              <a:t>[Closing]</a:t>
             </a:r>
             <a:endParaRPr/>
           </a:p>
@@ -6898,725 +6498,7 @@
       </p:sp>
       <p:sp>
         <p:nvSpPr>
-          <p:cNvPr id="109" name="Google Shape;109;p22"/>
-          <p:cNvSpPr txBox="1"/>
-          <p:nvPr>
-            <p:ph idx="1" type="body"/>
-          </p:nvPr>
-        </p:nvSpPr>
-        <p:spPr>
-          <a:xfrm>
-            <a:off x="311700" y="1152475"/>
-            <a:ext cx="8520600" cy="3416400"/>
-          </a:xfrm>
-          <a:prstGeom prst="rect">
-            <a:avLst/>
-          </a:prstGeom>
-        </p:spPr>
-        <p:txBody>
-          <a:bodyPr anchorCtr="0" anchor="t" bIns="91425" lIns="91425" spcFirstLastPara="1" rIns="91425" wrap="square" tIns="91425">
-            <a:normAutofit fontScale="55000" lnSpcReduction="20000"/>
-          </a:bodyPr>
-          <a:lstStyle/>
-          <a:p>
-            <a:pPr indent="0" lvl="0" marL="0" rtl="0" algn="l">
-              <a:spcBef>
-                <a:spcPts val="0"/>
-              </a:spcBef>
-              <a:spcAft>
-                <a:spcPts val="0"/>
-              </a:spcAft>
-              <a:buClr>
-                <a:schemeClr val="dk1"/>
-              </a:buClr>
-              <a:buSzPct val="61111"/>
-              <a:buFont typeface="Arial"/>
-              <a:buNone/>
-            </a:pPr>
-            <a:r>
-              <a:rPr lang="en"/>
-              <a:t>**README.md:**</a:t>
-            </a:r>
-            <a:br>
-              <a:rPr lang="en"/>
-            </a:br>
-            <a:r>
-              <a:rPr lang="en"/>
-              <a:t>"The project's README.md provides a quick guide on setting up Ruby and cloning the repository. It's your first step toward seamless web application testing."</a:t>
-            </a:r>
-            <a:endParaRPr/>
-          </a:p>
-          <a:p>
-            <a:pPr indent="0" lvl="0" marL="0" rtl="0" algn="l">
-              <a:spcBef>
-                <a:spcPts val="1200"/>
-              </a:spcBef>
-              <a:spcAft>
-                <a:spcPts val="0"/>
-              </a:spcAft>
-              <a:buClr>
-                <a:schemeClr val="dk1"/>
-              </a:buClr>
-              <a:buSzPct val="61111"/>
-              <a:buFont typeface="Arial"/>
-              <a:buNone/>
-            </a:pPr>
-            <a:r>
-              <a:rPr lang="en"/>
-              <a:t>**Rakefile:**</a:t>
-            </a:r>
-            <a:br>
-              <a:rPr lang="en"/>
-            </a:br>
-            <a:r>
-              <a:rPr lang="en"/>
-              <a:t>"The Rakefile is the orchestrator of our automation symphony. It defines tasks, including running our tests, making our testing process efficient and organized."</a:t>
-            </a:r>
-            <a:endParaRPr/>
-          </a:p>
-          <a:p>
-            <a:pPr indent="0" lvl="0" marL="0" rtl="0" algn="l">
-              <a:spcBef>
-                <a:spcPts val="1200"/>
-              </a:spcBef>
-              <a:spcAft>
-                <a:spcPts val="0"/>
-              </a:spcAft>
-              <a:buClr>
-                <a:schemeClr val="dk1"/>
-              </a:buClr>
-              <a:buSzPct val="61111"/>
-              <a:buFont typeface="Arial"/>
-              <a:buNone/>
-            </a:pPr>
-            <a:r>
-              <a:rPr lang="en"/>
-              <a:t>**GemFile:**</a:t>
-            </a:r>
-            <a:br>
-              <a:rPr lang="en"/>
-            </a:br>
-            <a:r>
-              <a:rPr lang="en"/>
-              <a:t>"The Gemfile lists the project's dependencies, ensuring that we have all the necessary gems, such as Selenium WebDriver and Minitest, at our disposal."</a:t>
-            </a:r>
-            <a:endParaRPr/>
-          </a:p>
-          <a:p>
-            <a:pPr indent="0" lvl="0" marL="0" rtl="0" algn="l">
-              <a:spcBef>
-                <a:spcPts val="1200"/>
-              </a:spcBef>
-              <a:spcAft>
-                <a:spcPts val="0"/>
-              </a:spcAft>
-              <a:buClr>
-                <a:schemeClr val="dk1"/>
-              </a:buClr>
-              <a:buSzPct val="61111"/>
-              <a:buFont typeface="Arial"/>
-              <a:buNone/>
-            </a:pPr>
-            <a:r>
-              <a:rPr lang="en"/>
-              <a:t>**test_helper.rb:**</a:t>
-            </a:r>
-            <a:br>
-              <a:rPr lang="en"/>
-            </a:br>
-            <a:r>
-              <a:rPr lang="en"/>
-              <a:t>"The test_helper.rb file config</a:t>
-            </a:r>
-            <a:r>
-              <a:rPr lang="en"/>
-              <a:t>u</a:t>
-            </a:r>
-            <a:r>
-              <a:rPr lang="en"/>
-              <a:t>res Minitest and sets up the HTML reporter, enhancing the clarity of our test results."</a:t>
-            </a:r>
-            <a:endParaRPr/>
-          </a:p>
-          <a:p>
-            <a:pPr indent="0" lvl="0" marL="0" rtl="0" algn="l">
-              <a:spcBef>
-                <a:spcPts val="1200"/>
-              </a:spcBef>
-              <a:spcAft>
-                <a:spcPts val="0"/>
-              </a:spcAft>
-              <a:buClr>
-                <a:schemeClr val="dk1"/>
-              </a:buClr>
-              <a:buSzPct val="61111"/>
-              <a:buFont typeface="Arial"/>
-              <a:buNone/>
-            </a:pPr>
-            <a:r>
-              <a:rPr lang="en"/>
-              <a:t>**webdriver_helper.rb:**</a:t>
-            </a:r>
-            <a:br>
-              <a:rPr lang="en"/>
-            </a:br>
-            <a:r>
-              <a:rPr lang="en"/>
-              <a:t>"The webdriver_helper.rb file initializes the Selenium WebDriver, configuring it with specific options. It ensures a smooth interaction between Ruby and the web browser during testing."</a:t>
-            </a:r>
-            <a:endParaRPr/>
-          </a:p>
-          <a:p>
-            <a:pPr indent="0" lvl="0" marL="0" rtl="0" algn="l">
-              <a:spcBef>
-                <a:spcPts val="1200"/>
-              </a:spcBef>
-              <a:spcAft>
-                <a:spcPts val="1200"/>
-              </a:spcAft>
-              <a:buNone/>
-            </a:pPr>
-            <a:r>
-              <a:rPr lang="en"/>
-              <a:t>**checkboxes_test.rb and disappearing_elements_test.rb:**</a:t>
-            </a:r>
-            <a:br>
-              <a:rPr lang="en"/>
-            </a:br>
-            <a:r>
-              <a:rPr lang="en"/>
-              <a:t>"These test files showcase our testing prowess. For instance, checkboxes_test.rb toggles checkboxes and disappearing_elements_test.rb ensures elements disappear and reappear as expected."</a:t>
-            </a:r>
-            <a:endParaRPr/>
-          </a:p>
-        </p:txBody>
-      </p:sp>
-    </p:spTree>
-  </p:cSld>
-  <p:clrMapOvr>
-    <a:masterClrMapping/>
-  </p:clrMapOvr>
-</p:sld>
-</file>
-
-<file path=ppt/slides/slide11.xml><?xml version="1.0" encoding="utf-8"?>
-<p:sld xmlns:a="http://schemas.openxmlformats.org/drawingml/2006/main" xmlns:r="http://schemas.openxmlformats.org/officeDocument/2006/relationships" xmlns:mc="http://schemas.openxmlformats.org/markup-compatibility/2006" xmlns:mv="urn:schemas-microsoft-com:mac:vml" xmlns:p="http://schemas.openxmlformats.org/presentationml/2006/main" xmlns:c="http://schemas.openxmlformats.org/drawingml/2006/chart" xmlns:dgm="http://schemas.openxmlformats.org/drawingml/2006/diagram" xmlns:o="urn:schemas-microsoft-com:office:office" xmlns:v="urn:schemas-microsoft-com:vml" xmlns:pvml="urn:schemas-microsoft-com:office:powerpoint" xmlns:com="http://schemas.openxmlformats.org/drawingml/2006/compatibility" xmlns:p14="http://schemas.microsoft.com/office/powerpoint/2010/main" xmlns:p15="http://schemas.microsoft.com/office/powerpoint/2012/main" xmlns:ahyp="http://schemas.microsoft.com/office/drawing/2018/hyperlinkcolor">
-  <p:cSld>
-    <p:spTree>
-      <p:nvGrpSpPr>
-        <p:cNvPr id="113" name="Shape 113"/>
-        <p:cNvGrpSpPr/>
-        <p:nvPr/>
-      </p:nvGrpSpPr>
-      <p:grpSpPr>
-        <a:xfrm>
-          <a:off x="0" y="0"/>
-          <a:ext cx="0" cy="0"/>
-          <a:chOff x="0" y="0"/>
-          <a:chExt cx="0" cy="0"/>
-        </a:xfrm>
-      </p:grpSpPr>
-      <p:sp>
-        <p:nvSpPr>
-          <p:cNvPr id="114" name="Google Shape;114;p23"/>
-          <p:cNvSpPr txBox="1"/>
-          <p:nvPr>
-            <p:ph type="title"/>
-          </p:nvPr>
-        </p:nvSpPr>
-        <p:spPr>
-          <a:xfrm>
-            <a:off x="311700" y="445025"/>
-            <a:ext cx="8520600" cy="572700"/>
-          </a:xfrm>
-          <a:prstGeom prst="rect">
-            <a:avLst/>
-          </a:prstGeom>
-        </p:spPr>
-        <p:txBody>
-          <a:bodyPr anchorCtr="0" anchor="t" bIns="91425" lIns="91425" spcFirstLastPara="1" rIns="91425" wrap="square" tIns="91425">
-            <a:normAutofit fontScale="90000"/>
-          </a:bodyPr>
-          <a:lstStyle/>
-          <a:p>
-            <a:pPr indent="0" lvl="0" marL="0" rtl="0" algn="l">
-              <a:spcBef>
-                <a:spcPts val="0"/>
-              </a:spcBef>
-              <a:spcAft>
-                <a:spcPts val="0"/>
-              </a:spcAft>
-              <a:buNone/>
-            </a:pPr>
-            <a:r>
-              <a:rPr lang="en"/>
-              <a:t>[Code Files Overview]</a:t>
-            </a:r>
-            <a:endParaRPr/>
-          </a:p>
-        </p:txBody>
-      </p:sp>
-      <p:sp>
-        <p:nvSpPr>
-          <p:cNvPr id="115" name="Google Shape;115;p23"/>
-          <p:cNvSpPr txBox="1"/>
-          <p:nvPr>
-            <p:ph idx="1" type="body"/>
-          </p:nvPr>
-        </p:nvSpPr>
-        <p:spPr>
-          <a:xfrm>
-            <a:off x="311700" y="1152475"/>
-            <a:ext cx="8520600" cy="3416400"/>
-          </a:xfrm>
-          <a:prstGeom prst="rect">
-            <a:avLst/>
-          </a:prstGeom>
-        </p:spPr>
-        <p:txBody>
-          <a:bodyPr anchorCtr="0" anchor="t" bIns="91425" lIns="91425" spcFirstLastPara="1" rIns="91425" wrap="square" tIns="91425">
-            <a:normAutofit fontScale="55000" lnSpcReduction="20000"/>
-          </a:bodyPr>
-          <a:lstStyle/>
-          <a:p>
-            <a:pPr indent="0" lvl="0" marL="0" rtl="0" algn="l">
-              <a:spcBef>
-                <a:spcPts val="0"/>
-              </a:spcBef>
-              <a:spcAft>
-                <a:spcPts val="0"/>
-              </a:spcAft>
-              <a:buClr>
-                <a:schemeClr val="dk1"/>
-              </a:buClr>
-              <a:buSzPct val="61111"/>
-              <a:buFont typeface="Arial"/>
-              <a:buNone/>
-            </a:pPr>
-            <a:r>
-              <a:rPr lang="en"/>
-              <a:t>"Now, let's take a closer look at the key code files in our project:</a:t>
-            </a:r>
-            <a:endParaRPr/>
-          </a:p>
-          <a:p>
-            <a:pPr indent="0" lvl="0" marL="0" rtl="0" algn="l">
-              <a:spcBef>
-                <a:spcPts val="1200"/>
-              </a:spcBef>
-              <a:spcAft>
-                <a:spcPts val="0"/>
-              </a:spcAft>
-              <a:buClr>
-                <a:schemeClr val="dk1"/>
-              </a:buClr>
-              <a:buSzPct val="61111"/>
-              <a:buFont typeface="Arial"/>
-              <a:buNone/>
-            </a:pPr>
-            <a:r>
-              <a:rPr lang="en"/>
-              <a:t>1. **README.md:**</a:t>
-            </a:r>
-            <a:br>
-              <a:rPr lang="en"/>
-            </a:br>
-            <a:r>
-              <a:rPr lang="en"/>
-              <a:t>   - Guides users on setting up Ruby and running tests using bundler.</a:t>
-            </a:r>
-            <a:endParaRPr/>
-          </a:p>
-          <a:p>
-            <a:pPr indent="0" lvl="0" marL="0" rtl="0" algn="l">
-              <a:spcBef>
-                <a:spcPts val="1200"/>
-              </a:spcBef>
-              <a:spcAft>
-                <a:spcPts val="0"/>
-              </a:spcAft>
-              <a:buClr>
-                <a:schemeClr val="dk1"/>
-              </a:buClr>
-              <a:buSzPct val="61111"/>
-              <a:buFont typeface="Arial"/>
-              <a:buNone/>
-            </a:pPr>
-            <a:r>
-              <a:rPr lang="en"/>
-              <a:t>2. **Rakefile:**</a:t>
-            </a:r>
-            <a:br>
-              <a:rPr lang="en"/>
-            </a:br>
-            <a:r>
-              <a:rPr lang="en"/>
-              <a:t>   - Defines the default task and configuration for running tests.</a:t>
-            </a:r>
-            <a:endParaRPr/>
-          </a:p>
-          <a:p>
-            <a:pPr indent="0" lvl="0" marL="0" rtl="0" algn="l">
-              <a:spcBef>
-                <a:spcPts val="1200"/>
-              </a:spcBef>
-              <a:spcAft>
-                <a:spcPts val="0"/>
-              </a:spcAft>
-              <a:buClr>
-                <a:schemeClr val="dk1"/>
-              </a:buClr>
-              <a:buSzPct val="61111"/>
-              <a:buFont typeface="Arial"/>
-              <a:buNone/>
-            </a:pPr>
-            <a:r>
-              <a:rPr lang="en"/>
-              <a:t> 3. **Gemfile:**</a:t>
-            </a:r>
-            <a:br>
-              <a:rPr lang="en"/>
-            </a:br>
-            <a:r>
-              <a:rPr lang="en"/>
-              <a:t>   - Lists project dependencies, including Selenium WebDriver and Minitest.</a:t>
-            </a:r>
-            <a:endParaRPr/>
-          </a:p>
-          <a:p>
-            <a:pPr indent="0" lvl="0" marL="0" rtl="0" algn="l">
-              <a:spcBef>
-                <a:spcPts val="1200"/>
-              </a:spcBef>
-              <a:spcAft>
-                <a:spcPts val="0"/>
-              </a:spcAft>
-              <a:buClr>
-                <a:schemeClr val="dk1"/>
-              </a:buClr>
-              <a:buSzPct val="61111"/>
-              <a:buFont typeface="Arial"/>
-              <a:buNone/>
-            </a:pPr>
-            <a:r>
-              <a:rPr lang="en"/>
-              <a:t>4. **test_helper.rb:**</a:t>
-            </a:r>
-            <a:br>
-              <a:rPr lang="en"/>
-            </a:br>
-            <a:r>
-              <a:rPr lang="en"/>
-              <a:t>   - Configures Minitest to use HTML reporting.</a:t>
-            </a:r>
-            <a:endParaRPr/>
-          </a:p>
-          <a:p>
-            <a:pPr indent="0" lvl="0" marL="0" rtl="0" algn="l">
-              <a:spcBef>
-                <a:spcPts val="1200"/>
-              </a:spcBef>
-              <a:spcAft>
-                <a:spcPts val="0"/>
-              </a:spcAft>
-              <a:buClr>
-                <a:schemeClr val="dk1"/>
-              </a:buClr>
-              <a:buSzPct val="61111"/>
-              <a:buFont typeface="Arial"/>
-              <a:buNone/>
-            </a:pPr>
-            <a:r>
-              <a:rPr lang="en"/>
-              <a:t>5. **webdriver_helper.rb:**</a:t>
-            </a:r>
-            <a:br>
-              <a:rPr lang="en"/>
-            </a:br>
-            <a:r>
-              <a:rPr lang="en"/>
-              <a:t>   - Initializes the Selenium WebDriver with specific configurations.</a:t>
-            </a:r>
-            <a:endParaRPr/>
-          </a:p>
-          <a:p>
-            <a:pPr indent="0" lvl="0" marL="0" rtl="0" algn="l">
-              <a:spcBef>
-                <a:spcPts val="1200"/>
-              </a:spcBef>
-              <a:spcAft>
-                <a:spcPts val="0"/>
-              </a:spcAft>
-              <a:buClr>
-                <a:schemeClr val="dk1"/>
-              </a:buClr>
-              <a:buSzPct val="61111"/>
-              <a:buFont typeface="Arial"/>
-              <a:buNone/>
-            </a:pPr>
-            <a:r>
-              <a:rPr lang="en"/>
-              <a:t>6. **checkboxes_test.rb:**</a:t>
-            </a:r>
-            <a:br>
-              <a:rPr lang="en"/>
-            </a:br>
-            <a:r>
-              <a:rPr lang="en"/>
-              <a:t>   - Demonstrates toggling checkboxes on a web page using Selenium.</a:t>
-            </a:r>
-            <a:endParaRPr/>
-          </a:p>
-          <a:p>
-            <a:pPr indent="0" lvl="0" marL="0" rtl="0" algn="l">
-              <a:spcBef>
-                <a:spcPts val="1200"/>
-              </a:spcBef>
-              <a:spcAft>
-                <a:spcPts val="1200"/>
-              </a:spcAft>
-              <a:buNone/>
-            </a:pPr>
-            <a:r>
-              <a:rPr lang="en"/>
-              <a:t>7. **disappearing_elements_test.rb:**</a:t>
-            </a:r>
-            <a:br>
-              <a:rPr lang="en"/>
-            </a:br>
-            <a:r>
-              <a:rPr lang="en"/>
-              <a:t>   - Illustrates handling disappearing elements on a web page by refreshing with Selenium.</a:t>
-            </a:r>
-            <a:endParaRPr/>
-          </a:p>
-        </p:txBody>
-      </p:sp>
-    </p:spTree>
-  </p:cSld>
-  <p:clrMapOvr>
-    <a:masterClrMapping/>
-  </p:clrMapOvr>
-</p:sld>
-</file>
-
-<file path=ppt/slides/slide12.xml><?xml version="1.0" encoding="utf-8"?>
-<p:sld xmlns:a="http://schemas.openxmlformats.org/drawingml/2006/main" xmlns:r="http://schemas.openxmlformats.org/officeDocument/2006/relationships" xmlns:mc="http://schemas.openxmlformats.org/markup-compatibility/2006" xmlns:mv="urn:schemas-microsoft-com:mac:vml" xmlns:p="http://schemas.openxmlformats.org/presentationml/2006/main" xmlns:c="http://schemas.openxmlformats.org/drawingml/2006/chart" xmlns:dgm="http://schemas.openxmlformats.org/drawingml/2006/diagram" xmlns:o="urn:schemas-microsoft-com:office:office" xmlns:v="urn:schemas-microsoft-com:vml" xmlns:pvml="urn:schemas-microsoft-com:office:powerpoint" xmlns:com="http://schemas.openxmlformats.org/drawingml/2006/compatibility" xmlns:p14="http://schemas.microsoft.com/office/powerpoint/2010/main" xmlns:p15="http://schemas.microsoft.com/office/powerpoint/2012/main" xmlns:ahyp="http://schemas.microsoft.com/office/drawing/2018/hyperlinkcolor">
-  <p:cSld>
-    <p:spTree>
-      <p:nvGrpSpPr>
-        <p:cNvPr id="119" name="Shape 119"/>
-        <p:cNvGrpSpPr/>
-        <p:nvPr/>
-      </p:nvGrpSpPr>
-      <p:grpSpPr>
-        <a:xfrm>
-          <a:off x="0" y="0"/>
-          <a:ext cx="0" cy="0"/>
-          <a:chOff x="0" y="0"/>
-          <a:chExt cx="0" cy="0"/>
-        </a:xfrm>
-      </p:grpSpPr>
-      <p:sp>
-        <p:nvSpPr>
-          <p:cNvPr id="120" name="Google Shape;120;p24"/>
-          <p:cNvSpPr txBox="1"/>
-          <p:nvPr>
-            <p:ph type="title"/>
-          </p:nvPr>
-        </p:nvSpPr>
-        <p:spPr>
-          <a:xfrm>
-            <a:off x="311700" y="445025"/>
-            <a:ext cx="8520600" cy="572700"/>
-          </a:xfrm>
-          <a:prstGeom prst="rect">
-            <a:avLst/>
-          </a:prstGeom>
-        </p:spPr>
-        <p:txBody>
-          <a:bodyPr anchorCtr="0" anchor="t" bIns="91425" lIns="91425" spcFirstLastPara="1" rIns="91425" wrap="square" tIns="91425">
-            <a:normAutofit fontScale="90000"/>
-          </a:bodyPr>
-          <a:lstStyle/>
-          <a:p>
-            <a:pPr indent="0" lvl="0" marL="0" rtl="0" algn="l">
-              <a:spcBef>
-                <a:spcPts val="0"/>
-              </a:spcBef>
-              <a:spcAft>
-                <a:spcPts val="0"/>
-              </a:spcAft>
-              <a:buNone/>
-            </a:pPr>
-            <a:r>
-              <a:rPr lang="en"/>
-              <a:t>[Inspirational Anecdote]</a:t>
-            </a:r>
-            <a:endParaRPr/>
-          </a:p>
-        </p:txBody>
-      </p:sp>
-      <p:sp>
-        <p:nvSpPr>
-          <p:cNvPr id="121" name="Google Shape;121;p24"/>
-          <p:cNvSpPr txBox="1"/>
-          <p:nvPr>
-            <p:ph idx="1" type="body"/>
-          </p:nvPr>
-        </p:nvSpPr>
-        <p:spPr>
-          <a:xfrm>
-            <a:off x="311700" y="1152475"/>
-            <a:ext cx="8520600" cy="3416400"/>
-          </a:xfrm>
-          <a:prstGeom prst="rect">
-            <a:avLst/>
-          </a:prstGeom>
-        </p:spPr>
-        <p:txBody>
-          <a:bodyPr anchorCtr="0" anchor="t" bIns="91425" lIns="91425" spcFirstLastPara="1" rIns="91425" wrap="square" tIns="91425">
-            <a:normAutofit lnSpcReduction="20000"/>
-          </a:bodyPr>
-          <a:lstStyle/>
-          <a:p>
-            <a:pPr indent="0" lvl="0" marL="0" rtl="0" algn="l">
-              <a:spcBef>
-                <a:spcPts val="0"/>
-              </a:spcBef>
-              <a:spcAft>
-                <a:spcPts val="0"/>
-              </a:spcAft>
-              <a:buClr>
-                <a:schemeClr val="dk1"/>
-              </a:buClr>
-              <a:buSzPts val="1100"/>
-              <a:buFont typeface="Arial"/>
-              <a:buNone/>
-            </a:pPr>
-            <a:r>
-              <a:rPr lang="en"/>
-              <a:t>"But hey, before we wrap up, let me share a quick automation anecdote. Remember, automation is like having a robot sidekick – it never gets tired, never complains, and always follows instructions. If only our pets were as obedient!"</a:t>
-            </a:r>
-            <a:endParaRPr/>
-          </a:p>
-          <a:p>
-            <a:pPr indent="0" lvl="0" marL="0" rtl="0" algn="l">
-              <a:spcBef>
-                <a:spcPts val="1200"/>
-              </a:spcBef>
-              <a:spcAft>
-                <a:spcPts val="0"/>
-              </a:spcAft>
-              <a:buNone/>
-            </a:pPr>
-            <a:r>
-              <a:rPr lang="en"/>
-              <a:t>Remember, in the world of automation, every line of code you write is a step toward a more efficient and reliable testing process. Embrace the power of automation, and let your tests be the guardians of quality!</a:t>
-            </a:r>
-            <a:endParaRPr/>
-          </a:p>
-          <a:p>
-            <a:pPr indent="0" lvl="0" marL="0" rtl="0" algn="l">
-              <a:spcBef>
-                <a:spcPts val="1200"/>
-              </a:spcBef>
-              <a:spcAft>
-                <a:spcPts val="0"/>
-              </a:spcAft>
-              <a:buNone/>
-            </a:pPr>
-            <a:r>
-              <a:rPr lang="en"/>
-              <a:t>Remember, automation is not just about saving time—it's about empowering developers and testers to focus on creativity and innovation. Just like automation tools, we strive to make testing an art form!</a:t>
-            </a:r>
-            <a:endParaRPr/>
-          </a:p>
-          <a:p>
-            <a:pPr indent="0" lvl="0" marL="0" rtl="0" algn="l">
-              <a:spcBef>
-                <a:spcPts val="1200"/>
-              </a:spcBef>
-              <a:spcAft>
-                <a:spcPts val="1200"/>
-              </a:spcAft>
-              <a:buNone/>
-            </a:pPr>
-            <a:r>
-              <a:t/>
-            </a:r>
-            <a:endParaRPr/>
-          </a:p>
-        </p:txBody>
-      </p:sp>
-    </p:spTree>
-  </p:cSld>
-  <p:clrMapOvr>
-    <a:masterClrMapping/>
-  </p:clrMapOvr>
-</p:sld>
-</file>
-
-<file path=ppt/slides/slide13.xml><?xml version="1.0" encoding="utf-8"?>
-<p:sld xmlns:a="http://schemas.openxmlformats.org/drawingml/2006/main" xmlns:r="http://schemas.openxmlformats.org/officeDocument/2006/relationships" xmlns:mc="http://schemas.openxmlformats.org/markup-compatibility/2006" xmlns:mv="urn:schemas-microsoft-com:mac:vml" xmlns:p="http://schemas.openxmlformats.org/presentationml/2006/main" xmlns:c="http://schemas.openxmlformats.org/drawingml/2006/chart" xmlns:dgm="http://schemas.openxmlformats.org/drawingml/2006/diagram" xmlns:o="urn:schemas-microsoft-com:office:office" xmlns:v="urn:schemas-microsoft-com:vml" xmlns:pvml="urn:schemas-microsoft-com:office:powerpoint" xmlns:com="http://schemas.openxmlformats.org/drawingml/2006/compatibility" xmlns:p14="http://schemas.microsoft.com/office/powerpoint/2010/main" xmlns:p15="http://schemas.microsoft.com/office/powerpoint/2012/main" xmlns:ahyp="http://schemas.microsoft.com/office/drawing/2018/hyperlinkcolor">
-  <p:cSld>
-    <p:spTree>
-      <p:nvGrpSpPr>
-        <p:cNvPr id="125" name="Shape 125"/>
-        <p:cNvGrpSpPr/>
-        <p:nvPr/>
-      </p:nvGrpSpPr>
-      <p:grpSpPr>
-        <a:xfrm>
-          <a:off x="0" y="0"/>
-          <a:ext cx="0" cy="0"/>
-          <a:chOff x="0" y="0"/>
-          <a:chExt cx="0" cy="0"/>
-        </a:xfrm>
-      </p:grpSpPr>
-      <p:sp>
-        <p:nvSpPr>
-          <p:cNvPr id="126" name="Google Shape;126;p25"/>
-          <p:cNvSpPr txBox="1"/>
-          <p:nvPr>
-            <p:ph type="title"/>
-          </p:nvPr>
-        </p:nvSpPr>
-        <p:spPr>
-          <a:xfrm>
-            <a:off x="311700" y="445025"/>
-            <a:ext cx="8520600" cy="572700"/>
-          </a:xfrm>
-          <a:prstGeom prst="rect">
-            <a:avLst/>
-          </a:prstGeom>
-        </p:spPr>
-        <p:txBody>
-          <a:bodyPr anchorCtr="0" anchor="t" bIns="91425" lIns="91425" spcFirstLastPara="1" rIns="91425" wrap="square" tIns="91425">
-            <a:normAutofit fontScale="90000"/>
-          </a:bodyPr>
-          <a:lstStyle/>
-          <a:p>
-            <a:pPr indent="0" lvl="0" marL="0" rtl="0" algn="l">
-              <a:spcBef>
-                <a:spcPts val="0"/>
-              </a:spcBef>
-              <a:spcAft>
-                <a:spcPts val="0"/>
-              </a:spcAft>
-              <a:buNone/>
-            </a:pPr>
-            <a:r>
-              <a:rPr lang="en"/>
-              <a:t>[Humorous Quips]</a:t>
-            </a:r>
-            <a:endParaRPr/>
-          </a:p>
-        </p:txBody>
-      </p:sp>
-      <p:sp>
-        <p:nvSpPr>
-          <p:cNvPr id="127" name="Google Shape;127;p25"/>
+          <p:cNvPr id="110" name="Google Shape;110;p22"/>
           <p:cNvSpPr txBox="1"/>
           <p:nvPr>
             <p:ph idx="1" type="body"/>
@@ -7648,7 +6530,7 @@
             </a:pPr>
             <a:r>
               <a:rPr lang="en"/>
-              <a:t>And speaking of obedience, our code doesn't take coffee breaks or sneak out for snacks. It's always on duty, ensuring our web application behaves impeccably.</a:t>
+              <a:t>So! automation not only helps save time, it helps raise the quality and reliability of your applications. I hope you've gained insights into the seamless collaboration of Selenium, Ruby, Rake, Minitest, and Minitest-Reporters in creating a testing framework for web applications. </a:t>
             </a:r>
             <a:endParaRPr/>
           </a:p>
@@ -7664,7 +6546,7 @@
             </a:pPr>
             <a:r>
               <a:rPr lang="en"/>
-              <a:t>Automation: where robots do the heavy lifting, and we get to enjoy our coffee a bit longer! Who said testing can't have a sense of humor? Cheers to error-free code and automated success!</a:t>
+              <a:t>That's a wrap for our end-to-end web application testing adventure! If you enjoyed this journey, don't forget to like, subscribe, and hit that notification bell. </a:t>
             </a:r>
             <a:endParaRPr/>
           </a:p>
@@ -7674,118 +6556,13 @@
                 <a:spcPts val="1200"/>
               </a:spcBef>
               <a:spcAft>
-                <a:spcPts val="1200"/>
+                <a:spcPts val="0"/>
               </a:spcAft>
               <a:buNone/>
             </a:pPr>
             <a:r>
               <a:rPr lang="en"/>
-              <a:t>Why do programmers prefer automation? Because it's the only time they enjoy watching something work on repeat without errors! Now, let's dive into the code and witness our web application testing magic unfold!</a:t>
-            </a:r>
-            <a:endParaRPr/>
-          </a:p>
-        </p:txBody>
-      </p:sp>
-    </p:spTree>
-  </p:cSld>
-  <p:clrMapOvr>
-    <a:masterClrMapping/>
-  </p:clrMapOvr>
-</p:sld>
-</file>
-
-<file path=ppt/slides/slide14.xml><?xml version="1.0" encoding="utf-8"?>
-<p:sld xmlns:a="http://schemas.openxmlformats.org/drawingml/2006/main" xmlns:r="http://schemas.openxmlformats.org/officeDocument/2006/relationships" xmlns:mc="http://schemas.openxmlformats.org/markup-compatibility/2006" xmlns:mv="urn:schemas-microsoft-com:mac:vml" xmlns:p="http://schemas.openxmlformats.org/presentationml/2006/main" xmlns:c="http://schemas.openxmlformats.org/drawingml/2006/chart" xmlns:dgm="http://schemas.openxmlformats.org/drawingml/2006/diagram" xmlns:o="urn:schemas-microsoft-com:office:office" xmlns:v="urn:schemas-microsoft-com:vml" xmlns:pvml="urn:schemas-microsoft-com:office:powerpoint" xmlns:com="http://schemas.openxmlformats.org/drawingml/2006/compatibility" xmlns:p14="http://schemas.microsoft.com/office/powerpoint/2010/main" xmlns:p15="http://schemas.microsoft.com/office/powerpoint/2012/main" xmlns:ahyp="http://schemas.microsoft.com/office/drawing/2018/hyperlinkcolor">
-  <p:cSld>
-    <p:spTree>
-      <p:nvGrpSpPr>
-        <p:cNvPr id="131" name="Shape 131"/>
-        <p:cNvGrpSpPr/>
-        <p:nvPr/>
-      </p:nvGrpSpPr>
-      <p:grpSpPr>
-        <a:xfrm>
-          <a:off x="0" y="0"/>
-          <a:ext cx="0" cy="0"/>
-          <a:chOff x="0" y="0"/>
-          <a:chExt cx="0" cy="0"/>
-        </a:xfrm>
-      </p:grpSpPr>
-      <p:sp>
-        <p:nvSpPr>
-          <p:cNvPr id="132" name="Google Shape;132;p26"/>
-          <p:cNvSpPr txBox="1"/>
-          <p:nvPr>
-            <p:ph type="title"/>
-          </p:nvPr>
-        </p:nvSpPr>
-        <p:spPr>
-          <a:xfrm>
-            <a:off x="311700" y="445025"/>
-            <a:ext cx="8520600" cy="572700"/>
-          </a:xfrm>
-          <a:prstGeom prst="rect">
-            <a:avLst/>
-          </a:prstGeom>
-        </p:spPr>
-        <p:txBody>
-          <a:bodyPr anchorCtr="0" anchor="t" bIns="91425" lIns="91425" spcFirstLastPara="1" rIns="91425" wrap="square" tIns="91425">
-            <a:normAutofit fontScale="90000"/>
-          </a:bodyPr>
-          <a:lstStyle/>
-          <a:p>
-            <a:pPr indent="0" lvl="0" marL="0" rtl="0" algn="l">
-              <a:spcBef>
-                <a:spcPts val="0"/>
-              </a:spcBef>
-              <a:spcAft>
-                <a:spcPts val="0"/>
-              </a:spcAft>
-              <a:buNone/>
-            </a:pPr>
-            <a:r>
-              <a:rPr lang="en"/>
-              <a:t>[Closing]</a:t>
-            </a:r>
-            <a:endParaRPr/>
-          </a:p>
-        </p:txBody>
-      </p:sp>
-      <p:sp>
-        <p:nvSpPr>
-          <p:cNvPr id="133" name="Google Shape;133;p26"/>
-          <p:cNvSpPr txBox="1"/>
-          <p:nvPr>
-            <p:ph idx="1" type="body"/>
-          </p:nvPr>
-        </p:nvSpPr>
-        <p:spPr>
-          <a:xfrm>
-            <a:off x="311700" y="1152475"/>
-            <a:ext cx="8520600" cy="3416400"/>
-          </a:xfrm>
-          <a:prstGeom prst="rect">
-            <a:avLst/>
-          </a:prstGeom>
-        </p:spPr>
-        <p:txBody>
-          <a:bodyPr anchorCtr="0" anchor="t" bIns="91425" lIns="91425" spcFirstLastPara="1" rIns="91425" wrap="square" tIns="91425">
-            <a:normAutofit lnSpcReduction="10000"/>
-          </a:bodyPr>
-          <a:lstStyle/>
-          <a:p>
-            <a:pPr indent="0" lvl="0" marL="0" rtl="0" algn="l">
-              <a:spcBef>
-                <a:spcPts val="0"/>
-              </a:spcBef>
-              <a:spcAft>
-                <a:spcPts val="0"/>
-              </a:spcAft>
-              <a:buNone/>
-            </a:pPr>
-            <a:r>
-              <a:rPr lang="en"/>
-              <a:t>That's a wrap for our end-to-end web application testing adventure! If you enjoyed this journey, don't forget to like, subscribe, and hit that notification bell. Happy coding, and may your tests be evergreen! Until next time, stay automated!</a:t>
+              <a:t>Happy coding, and may your tests be evergreen! Until next time, stay automated!</a:t>
             </a:r>
             <a:endParaRPr/>
           </a:p>
@@ -7795,29 +6572,18 @@
                 <a:spcPts val="1200"/>
               </a:spcBef>
               <a:spcAft>
-                <a:spcPts val="0"/>
-              </a:spcAft>
+                <a:spcPts val="1200"/>
+              </a:spcAft>
+              <a:buClr>
+                <a:schemeClr val="dk1"/>
+              </a:buClr>
+              <a:buSzPts val="1100"/>
+              <a:buFont typeface="Arial"/>
               <a:buNone/>
             </a:pPr>
             <a:r>
               <a:rPr lang="en"/>
-              <a:t>As we conclude this journey through our web testing project, remember that automation isn't just about saving time; it's about ensuring the quality and reliability of your applications. Happy testing, and may your code always run green!</a:t>
-            </a:r>
-            <a:endParaRPr/>
-          </a:p>
-          <a:p>
-            <a:pPr indent="0" lvl="0" marL="0" rtl="0" algn="l">
-              <a:spcBef>
-                <a:spcPts val="1200"/>
-              </a:spcBef>
-              <a:spcAft>
-                <a:spcPts val="1200"/>
-              </a:spcAft>
-              <a:buNone/>
-            </a:pPr>
-            <a:r>
-              <a:rPr lang="en"/>
-              <a:t>As we conclude this journey through our web testing project, we hope you've gained insights into the seamless collaboration of Selenium, Ruby, Rake, Minitest, and Minitest-Reporters. Happy testing, and may your code always run flawlessly!</a:t>
+              <a:t>Happy testing, and may your code always run flawlessly!</a:t>
             </a:r>
             <a:endParaRPr/>
           </a:p>
@@ -7972,6 +6738,22 @@
               <a:buChar char="●"/>
             </a:pPr>
             <a:r>
+              <a:t/>
+            </a:r>
+            <a:endParaRPr/>
+          </a:p>
+          <a:p>
+            <a:pPr indent="-342900" lvl="0" marL="457200" rtl="0" algn="l">
+              <a:spcBef>
+                <a:spcPts val="0"/>
+              </a:spcBef>
+              <a:spcAft>
+                <a:spcPts val="0"/>
+              </a:spcAft>
+              <a:buSzPts val="1800"/>
+              <a:buChar char="●"/>
+            </a:pPr>
+            <a:r>
               <a:rPr lang="en"/>
               <a:t>Tags: “</a:t>
             </a:r>
@@ -7987,6 +6769,32 @@
           </a:p>
         </p:txBody>
       </p:sp>
+      <p:cxnSp>
+        <p:nvCxnSpPr>
+          <p:cNvPr id="62" name="Google Shape;62;p14"/>
+          <p:cNvCxnSpPr/>
+          <p:nvPr/>
+        </p:nvCxnSpPr>
+        <p:spPr>
+          <a:xfrm>
+            <a:off x="877975" y="3628425"/>
+            <a:ext cx="7769700" cy="7800"/>
+          </a:xfrm>
+          <a:prstGeom prst="straightConnector1">
+            <a:avLst/>
+          </a:prstGeom>
+          <a:noFill/>
+          <a:ln cap="flat" cmpd="sng" w="9525">
+            <a:solidFill>
+              <a:schemeClr val="dk2"/>
+            </a:solidFill>
+            <a:prstDash val="solid"/>
+            <a:round/>
+            <a:headEnd len="med" w="med" type="none"/>
+            <a:tailEnd len="med" w="med" type="none"/>
+          </a:ln>
+        </p:spPr>
+      </p:cxnSp>
     </p:spTree>
   </p:cSld>
   <p:clrMapOvr>
@@ -8000,7 +6808,7 @@
   <p:cSld>
     <p:spTree>
       <p:nvGrpSpPr>
-        <p:cNvPr id="65" name="Shape 65"/>
+        <p:cNvPr id="66" name="Shape 66"/>
         <p:cNvGrpSpPr/>
         <p:nvPr/>
       </p:nvGrpSpPr>
@@ -8014,7 +6822,7 @@
       </p:grpSpPr>
       <p:sp>
         <p:nvSpPr>
-          <p:cNvPr id="66" name="Google Shape;66;p15"/>
+          <p:cNvPr id="67" name="Google Shape;67;p15"/>
           <p:cNvSpPr txBox="1"/>
           <p:nvPr>
             <p:ph type="title"/>
@@ -8094,7 +6902,7 @@
       </p:sp>
       <p:sp>
         <p:nvSpPr>
-          <p:cNvPr id="67" name="Google Shape;67;p15"/>
+          <p:cNvPr id="68" name="Google Shape;68;p15"/>
           <p:cNvSpPr txBox="1"/>
           <p:nvPr>
             <p:ph idx="1" type="body"/>
@@ -8111,7 +6919,7 @@
         </p:spPr>
         <p:txBody>
           <a:bodyPr anchorCtr="0" anchor="t" bIns="91425" lIns="91425" spcFirstLastPara="1" rIns="91425" wrap="square" tIns="91425">
-            <a:normAutofit fontScale="85000"/>
+            <a:normAutofit fontScale="92500" lnSpcReduction="10000"/>
           </a:bodyPr>
           <a:lstStyle/>
           <a:p>
@@ -8126,12 +6934,12 @@
             </a:pPr>
             <a:r>
               <a:rPr lang="en"/>
-              <a:t>Web applications use a web browser to launch an application or game. We need to build a virtual user that can use the browser application just like you or I would. Our approach involves:</a:t>
+              <a:t>Web applications use a web browser to launch an application or game. We need to build a virtual user that can use the browser application just like you or I would. My approach involves using the following tools:</a:t>
             </a:r>
             <a:endParaRPr/>
           </a:p>
           <a:p>
-            <a:pPr indent="-325755" lvl="0" marL="457200" rtl="0" algn="l">
+            <a:pPr indent="-334327" lvl="0" marL="457200" rtl="0" algn="l">
               <a:spcBef>
                 <a:spcPts val="1200"/>
               </a:spcBef>
@@ -8143,12 +6951,12 @@
             </a:pPr>
             <a:r>
               <a:rPr lang="en"/>
-              <a:t>Using the browser control tool "Selenium WebDriver", to impersonate a real life user.</a:t>
+              <a:t>browser control tool "Selenium WebDriver", to impersonate a real life user.</a:t>
             </a:r>
             <a:endParaRPr/>
           </a:p>
           <a:p>
-            <a:pPr indent="-325755" lvl="0" marL="457200" rtl="0" algn="l">
+            <a:pPr indent="-334327" lvl="0" marL="457200" rtl="0" algn="l">
               <a:spcBef>
                 <a:spcPts val="0"/>
               </a:spcBef>
@@ -8160,12 +6968,16 @@
             </a:pPr>
             <a:r>
               <a:rPr lang="en"/>
-              <a:t>Using Ruby as the programming language to use the browder control tool</a:t>
+              <a:t>Ruby programming language to tell the </a:t>
+            </a:r>
+            <a:r>
+              <a:rPr lang="en"/>
+              <a:t>Selenium WebDriver what actions to do</a:t>
             </a:r>
             <a:endParaRPr/>
           </a:p>
           <a:p>
-            <a:pPr indent="-325755" lvl="0" marL="457200" rtl="0" algn="l">
+            <a:pPr indent="-334327" lvl="0" marL="457200" rtl="0" algn="l">
               <a:spcBef>
                 <a:spcPts val="0"/>
               </a:spcBef>
@@ -8177,12 +6989,12 @@
             </a:pPr>
             <a:r>
               <a:rPr lang="en"/>
-              <a:t>Using Minitest to help us describe the tests that we  want to run on our selected web app</a:t>
+              <a:t>Minitest testing framework describe the browser actions, which will form the tests that for our web app</a:t>
             </a:r>
             <a:endParaRPr/>
           </a:p>
           <a:p>
-            <a:pPr indent="-325755" lvl="0" marL="457200" rtl="0" algn="l">
+            <a:pPr indent="-334327" lvl="0" marL="457200" rtl="0" algn="l">
               <a:spcBef>
                 <a:spcPts val="0"/>
               </a:spcBef>
@@ -8194,12 +7006,12 @@
             </a:pPr>
             <a:r>
               <a:rPr lang="en"/>
-              <a:t>Using Minitest-Reporters to report the results after running those automated tests</a:t>
+              <a:t>Minitest-Reporters to make pretty printed reports of minitest results</a:t>
             </a:r>
             <a:endParaRPr/>
           </a:p>
           <a:p>
-            <a:pPr indent="-325755" lvl="0" marL="457200" rtl="0" algn="l">
+            <a:pPr indent="-334327" lvl="0" marL="457200" rtl="0" algn="l">
               <a:spcBef>
                 <a:spcPts val="0"/>
               </a:spcBef>
@@ -8211,7 +7023,7 @@
             </a:pPr>
             <a:r>
               <a:rPr lang="en"/>
-              <a:t>Using Rake to automatically execute those tests</a:t>
+              <a:t>Rake to use one liner commands in order to run one or many tests and any other automation tasks. It will work as the command center console of the framework</a:t>
             </a:r>
             <a:endParaRPr/>
           </a:p>
@@ -8221,28 +7033,13 @@
                 <a:spcPts val="1200"/>
               </a:spcBef>
               <a:spcAft>
-                <a:spcPts val="0"/>
-              </a:spcAft>
-              <a:buNone/>
-            </a:pPr>
-            <a:r>
-              <a:t/>
-            </a:r>
-            <a:endParaRPr/>
-          </a:p>
-          <a:p>
-            <a:pPr indent="0" lvl="0" marL="0" rtl="0" algn="l">
-              <a:spcBef>
-                <a:spcPts val="1200"/>
-              </a:spcBef>
-              <a:spcAft>
                 <a:spcPts val="1200"/>
               </a:spcAft>
               <a:buNone/>
             </a:pPr>
             <a:r>
               <a:rPr lang="en"/>
-              <a:t>Let me break down the roles of each tool and library in </a:t>
+              <a:t>Let me break down the roles of each tool</a:t>
             </a:r>
             <a:endParaRPr/>
           </a:p>
@@ -8261,7 +7058,7 @@
   <p:cSld>
     <p:spTree>
       <p:nvGrpSpPr>
-        <p:cNvPr id="71" name="Shape 71"/>
+        <p:cNvPr id="72" name="Shape 72"/>
         <p:cNvGrpSpPr/>
         <p:nvPr/>
       </p:nvGrpSpPr>
@@ -8275,7 +7072,7 @@
       </p:grpSpPr>
       <p:sp>
         <p:nvSpPr>
-          <p:cNvPr id="72" name="Google Shape;72;p16"/>
+          <p:cNvPr id="73" name="Google Shape;73;p16"/>
           <p:cNvSpPr txBox="1"/>
           <p:nvPr>
             <p:ph type="title"/>
@@ -8312,10 +7109,6 @@
             </a:pPr>
             <a:r>
               <a:rPr lang="en"/>
-              <a:t>[ WIP ] </a:t>
-            </a:r>
-            <a:r>
-              <a:rPr lang="en"/>
               <a:t>[Tools and Libraries]</a:t>
             </a:r>
             <a:endParaRPr/>
@@ -8359,7 +7152,7 @@
       </p:sp>
       <p:sp>
         <p:nvSpPr>
-          <p:cNvPr id="73" name="Google Shape;73;p16"/>
+          <p:cNvPr id="74" name="Google Shape;74;p16"/>
           <p:cNvSpPr txBox="1"/>
           <p:nvPr>
             <p:ph idx="1" type="body"/>
@@ -8376,11 +7169,11 @@
         </p:spPr>
         <p:txBody>
           <a:bodyPr anchorCtr="0" anchor="t" bIns="91425" lIns="91425" spcFirstLastPara="1" rIns="91425" wrap="square" tIns="91425">
-            <a:normAutofit fontScale="77500"/>
+            <a:normAutofit fontScale="70000" lnSpcReduction="20000"/>
           </a:bodyPr>
           <a:lstStyle/>
           <a:p>
-            <a:pPr indent="-317182" lvl="0" marL="457200" rtl="0" algn="l">
+            <a:pPr indent="-308610" lvl="0" marL="457200" rtl="0" algn="l">
               <a:spcBef>
                 <a:spcPts val="0"/>
               </a:spcBef>
@@ -8400,12 +7193,20 @@
             </a:r>
             <a:r>
               <a:rPr lang="en"/>
-              <a:t>: This powerful tool allows us to automate browser actions, making our testing process efficient and reliable. It's the driving force behind our interactions with the web application."</a:t>
+              <a:t>: This tool allows us to automate actions in the browser by </a:t>
+            </a:r>
+            <a:r>
+              <a:rPr lang="en"/>
+              <a:t>impersonating</a:t>
+            </a:r>
+            <a:r>
+              <a:rPr lang="en"/>
+              <a:t> the actions of a real user. It's the driving force behind your interactions with web applications and web pages in Chrome, Firefox, Safari, and others. It supports being used from multiple programming languages and this flexibility allows programmers to choose the language they are most comfortable with. I will use the Ruby Programming language.</a:t>
             </a:r>
             <a:endParaRPr/>
           </a:p>
           <a:p>
-            <a:pPr indent="-317182" lvl="0" marL="457200" rtl="0" algn="l">
+            <a:pPr indent="-308610" lvl="0" marL="457200" rtl="0" algn="l">
               <a:spcBef>
                 <a:spcPts val="0"/>
               </a:spcBef>
@@ -8425,12 +7226,70 @@
             </a:r>
             <a:r>
               <a:rPr lang="en"/>
-              <a:t>: Our programming language of choice. Its simplicity and readability make it a fantastic companion for our testing endeavors. Plus, it's the backbone of our automation scripts."</a:t>
+              <a:t>: I chose Ruby because it seemed that I'll be able to start running code quickly and ruby code looked comparatively more readable compared to Java. I felt that I should be able to extend existing Ruby code and start writing my own code. Also I found enough Supportive Community and Documentation to make me feel comfortable in starting programming.</a:t>
             </a:r>
             <a:endParaRPr/>
           </a:p>
           <a:p>
-            <a:pPr indent="-317182" lvl="0" marL="457200" rtl="0" algn="l">
+            <a:pPr indent="-308610" lvl="0" marL="457200" rtl="0" algn="l">
+              <a:spcBef>
+                <a:spcPts val="0"/>
+              </a:spcBef>
+              <a:spcAft>
+                <a:spcPts val="0"/>
+              </a:spcAft>
+              <a:buSzPct val="100000"/>
+              <a:buAutoNum type="arabicPeriod"/>
+            </a:pPr>
+            <a:r>
+              <a:rPr lang="en"/>
+              <a:t>"</a:t>
+            </a:r>
+            <a:r>
+              <a:rPr b="1" lang="en"/>
+              <a:t>Minitest</a:t>
+            </a:r>
+            <a:r>
+              <a:rPr lang="en"/>
+              <a:t>: I chose minitest because it appears to be </a:t>
+            </a:r>
+            <a:r>
+              <a:rPr lang="en"/>
+              <a:t>easy to set up and integrate with Ruby. From examples I felt confident in writing my basic tests quickly.</a:t>
+            </a:r>
+            <a:endParaRPr/>
+          </a:p>
+          <a:p>
+            <a:pPr indent="-308610" lvl="0" marL="457200" rtl="0" algn="l">
+              <a:spcBef>
+                <a:spcPts val="0"/>
+              </a:spcBef>
+              <a:spcAft>
+                <a:spcPts val="0"/>
+              </a:spcAft>
+              <a:buSzPct val="100000"/>
+              <a:buAutoNum type="arabicPeriod"/>
+            </a:pPr>
+            <a:r>
+              <a:rPr b="1" lang="en"/>
+              <a:t>Minitest-Reporters:</a:t>
+            </a:r>
+            <a:r>
+              <a:rPr lang="en"/>
+              <a:t> I added this after running a test for the first time. All I saw on the screen was a green dot showing that the test passed. Minitest-reporters is a separate </a:t>
+            </a:r>
+            <a:r>
+              <a:rPr b="1" lang="en"/>
+              <a:t>gem </a:t>
+            </a:r>
+            <a:r>
+              <a:rPr lang="en"/>
+              <a:t>( extension pack ) that enhances the reporting capabilities of Minitest “dots”</a:t>
+            </a:r>
+            <a:endParaRPr/>
+          </a:p>
+          <a:p>
+            <a:pPr indent="-308610" lvl="0" marL="457200" rtl="0" algn="l">
               <a:spcBef>
                 <a:spcPts val="0"/>
               </a:spcBef>
@@ -8450,65 +7309,7 @@
             </a:r>
             <a:r>
               <a:rPr lang="en"/>
-              <a:t>: Meet our automation sidekick! Rake helps us organize and execute tasks seamlessly. It's a fantastic tool for automation, making our testing workflows more manageable."</a:t>
-            </a:r>
-            <a:endParaRPr/>
-          </a:p>
-          <a:p>
-            <a:pPr indent="-317182" lvl="0" marL="457200" rtl="0" algn="l">
-              <a:spcBef>
-                <a:spcPts val="0"/>
-              </a:spcBef>
-              <a:spcAft>
-                <a:spcPts val="0"/>
-              </a:spcAft>
-              <a:buSzPct val="100000"/>
-              <a:buAutoNum type="arabicPeriod"/>
-            </a:pPr>
-            <a:r>
-              <a:rPr lang="en"/>
-              <a:t>"</a:t>
-            </a:r>
-            <a:r>
-              <a:rPr b="1" lang="en"/>
-              <a:t>Minitest</a:t>
-            </a:r>
-            <a:r>
-              <a:rPr lang="en"/>
-              <a:t>: This lightweight testing framework ensures that our tests are structured, readable, and easy to maintain. It's our trusty companion in the world of tes</a:t>
-            </a:r>
-            <a:r>
-              <a:rPr lang="en"/>
-              <a:t>t</a:t>
-            </a:r>
-            <a:r>
-              <a:rPr lang="en"/>
-              <a:t>-driven development."</a:t>
-            </a:r>
-            <a:endParaRPr/>
-          </a:p>
-          <a:p>
-            <a:pPr indent="-317182" lvl="0" marL="457200" rtl="0" algn="l">
-              <a:spcBef>
-                <a:spcPts val="0"/>
-              </a:spcBef>
-              <a:spcAft>
-                <a:spcPts val="0"/>
-              </a:spcAft>
-              <a:buSzPct val="100000"/>
-              <a:buAutoNum type="arabicPeriod"/>
-            </a:pPr>
-            <a:r>
-              <a:rPr lang="en"/>
-              <a:t>"</a:t>
-            </a:r>
-            <a:r>
-              <a:rPr b="1" lang="en"/>
-              <a:t>Pros and Cons</a:t>
-            </a:r>
-            <a:r>
-              <a:rPr lang="en"/>
-              <a:t>: While Selenium offers robust browser automation, Ruby's elegance makes our code clean and expressive. Rake streamlines tasks, but keep in mind its learning curve. Minitest provides simplicity but may lack some advanced features."</a:t>
+              <a:t>: Rake allows you to define and automate tasks related to your testing framework, such as running groups of test called test-suites. Also it uses Ruby syntax so I won't have to learn YASL (yet-another-scripting-language)</a:t>
             </a:r>
             <a:endParaRPr/>
           </a:p>
@@ -8527,7 +7328,7 @@
   <p:cSld>
     <p:spTree>
       <p:nvGrpSpPr>
-        <p:cNvPr id="77" name="Shape 77"/>
+        <p:cNvPr id="78" name="Shape 78"/>
         <p:cNvGrpSpPr/>
         <p:nvPr/>
       </p:nvGrpSpPr>
@@ -8541,7 +7342,7 @@
       </p:grpSpPr>
       <p:sp>
         <p:nvSpPr>
-          <p:cNvPr id="78" name="Google Shape;78;p17"/>
+          <p:cNvPr id="79" name="Google Shape;79;p17"/>
           <p:cNvSpPr txBox="1"/>
           <p:nvPr>
             <p:ph type="title"/>
@@ -8569,51 +7370,11 @@
               <a:spcAft>
                 <a:spcPts val="0"/>
               </a:spcAft>
-              <a:buClr>
-                <a:schemeClr val="dk1"/>
-              </a:buClr>
-              <a:buSzPct val="39285"/>
-              <a:buFont typeface="Arial"/>
               <a:buNone/>
             </a:pPr>
             <a:r>
               <a:rPr lang="en"/>
-              <a:t>[Tools and Libraries Overview]</a:t>
-            </a:r>
-            <a:endParaRPr/>
-          </a:p>
-          <a:p>
-            <a:pPr indent="0" lvl="0" marL="0" rtl="0" algn="l">
-              <a:spcBef>
-                <a:spcPts val="0"/>
-              </a:spcBef>
-              <a:spcAft>
-                <a:spcPts val="0"/>
-              </a:spcAft>
-              <a:buClr>
-                <a:schemeClr val="dk1"/>
-              </a:buClr>
-              <a:buSzPct val="39285"/>
-              <a:buFont typeface="Arial"/>
-              <a:buNone/>
-            </a:pPr>
-            <a:r>
-              <a:t/>
-            </a:r>
-            <a:endParaRPr/>
-          </a:p>
-          <a:p>
-            <a:pPr indent="0" lvl="0" marL="0" rtl="0" algn="l">
-              <a:spcBef>
-                <a:spcPts val="0"/>
-              </a:spcBef>
-              <a:spcAft>
-                <a:spcPts val="0"/>
-              </a:spcAft>
-              <a:buNone/>
-            </a:pPr>
-            <a:r>
-              <a:t/>
+              <a:t>[Inspirational Anecdote]</a:t>
             </a:r>
             <a:endParaRPr/>
           </a:p>
@@ -8621,7 +7382,7 @@
       </p:sp>
       <p:sp>
         <p:nvSpPr>
-          <p:cNvPr id="79" name="Google Shape;79;p17"/>
+          <p:cNvPr id="80" name="Google Shape;80;p17"/>
           <p:cNvSpPr txBox="1"/>
           <p:nvPr>
             <p:ph idx="1" type="body"/>
@@ -8638,7 +7399,7 @@
         </p:spPr>
         <p:txBody>
           <a:bodyPr anchorCtr="0" anchor="t" bIns="91425" lIns="91425" spcFirstLastPara="1" rIns="91425" wrap="square" tIns="91425">
-            <a:normAutofit fontScale="77500" lnSpcReduction="20000"/>
+            <a:normAutofit/>
           </a:bodyPr>
           <a:lstStyle/>
           <a:p>
@@ -8652,21 +7413,13 @@
               <a:buClr>
                 <a:schemeClr val="dk1"/>
               </a:buClr>
-              <a:buSzPct val="61111"/>
+              <a:buSzPts val="1100"/>
               <a:buFont typeface="Arial"/>
               <a:buNone/>
             </a:pPr>
             <a:r>
               <a:rPr lang="en"/>
-              <a:t>"</a:t>
-            </a:r>
-            <a:r>
-              <a:rPr b="1" lang="en"/>
-              <a:t>Selenium WebDriver</a:t>
-            </a:r>
-            <a:r>
-              <a:rPr lang="en"/>
-              <a:t>, a cornerstone in our testing arsenal, provides a robust way to automate interactions with web browsers. Its versatility allows us to simulate user actions and validate the behavior of our web applications."</a:t>
+              <a:t>"So far it seems that this browser automation thing is beginning to look like having a robot sidekick – it never gets tired, never complains, and always follows instructions. If only our pets were as obedient! Or could impersonate us on the internet browser . . . nottt"</a:t>
             </a:r>
             <a:endParaRPr/>
           </a:p>
@@ -8678,24 +7431,10 @@
               <a:spcAft>
                 <a:spcPts val="0"/>
               </a:spcAft>
-              <a:buClr>
-                <a:schemeClr val="dk1"/>
-              </a:buClr>
-              <a:buSzPct val="61111"/>
-              <a:buFont typeface="Arial"/>
               <a:buNone/>
             </a:pPr>
             <a:r>
-              <a:rPr lang="en"/>
-              <a:t>"</a:t>
-            </a:r>
-            <a:r>
-              <a:rPr b="1" lang="en"/>
-              <a:t>Ruby</a:t>
-            </a:r>
-            <a:r>
-              <a:rPr lang="en"/>
-              <a:t>, the language of choice for our project, provides a clean and expressive syntax. Its integration with Selenium WebDriver ensures seamless automation, allowing us to write concise and readable test scripts."</a:t>
+              <a:t/>
             </a:r>
             <a:endParaRPr/>
           </a:p>
@@ -8707,24 +7446,10 @@
               <a:spcAft>
                 <a:spcPts val="0"/>
               </a:spcAft>
-              <a:buClr>
-                <a:schemeClr val="dk1"/>
-              </a:buClr>
-              <a:buSzPct val="61111"/>
-              <a:buFont typeface="Arial"/>
               <a:buNone/>
             </a:pPr>
             <a:r>
-              <a:rPr lang="en"/>
-              <a:t>"</a:t>
-            </a:r>
-            <a:r>
-              <a:rPr b="1" lang="en"/>
-              <a:t>Rake</a:t>
-            </a:r>
-            <a:r>
-              <a:rPr lang="en"/>
-              <a:t>, our automation task tool, plays a crucial role in managing and executing our tests. It simplifies the process, making it easy to run specific test suites or the entire suite with a single command."</a:t>
+              <a:t/>
             </a:r>
             <a:endParaRPr/>
           </a:p>
@@ -8734,50 +7459,12 @@
                 <a:spcPts val="1200"/>
               </a:spcBef>
               <a:spcAft>
-                <a:spcPts val="0"/>
-              </a:spcAft>
-              <a:buClr>
-                <a:schemeClr val="dk1"/>
-              </a:buClr>
-              <a:buSzPct val="61111"/>
-              <a:buFont typeface="Arial"/>
+                <a:spcPts val="1200"/>
+              </a:spcAft>
               <a:buNone/>
             </a:pPr>
             <a:r>
-              <a:rPr lang="en"/>
-              <a:t>"</a:t>
-            </a:r>
-            <a:r>
-              <a:rPr b="1" lang="en"/>
-              <a:t>Minitest</a:t>
-            </a:r>
-            <a:r>
-              <a:rPr lang="en"/>
-              <a:t>, our testing framework, provides a lightweight yet powerful testing environment. With minimal setup, we can create effective test cases and assertions, ensuring the reliability of our web app."</a:t>
-            </a:r>
-            <a:endParaRPr/>
-          </a:p>
-          <a:p>
-            <a:pPr indent="0" lvl="0" marL="0" rtl="0" algn="l">
-              <a:spcBef>
-                <a:spcPts val="1200"/>
-              </a:spcBef>
-              <a:spcAft>
-                <a:spcPts val="1200"/>
-              </a:spcAft>
-              <a:buNone/>
-            </a:pPr>
-            <a:r>
-              <a:rPr lang="en"/>
-              <a:t>"</a:t>
-            </a:r>
-            <a:r>
-              <a:rPr b="1" lang="en"/>
-              <a:t>Minitest-Reporters</a:t>
-            </a:r>
-            <a:r>
-              <a:rPr lang="en"/>
-              <a:t> enhances our testing experience by providing detailed reports. It generates HTML reports, giving us valuable insights into test results."</a:t>
+              <a:t/>
             </a:r>
             <a:endParaRPr/>
           </a:p>
@@ -8796,7 +7483,7 @@
   <p:cSld>
     <p:spTree>
       <p:nvGrpSpPr>
-        <p:cNvPr id="83" name="Shape 83"/>
+        <p:cNvPr id="84" name="Shape 84"/>
         <p:cNvGrpSpPr/>
         <p:nvPr/>
       </p:nvGrpSpPr>
@@ -8810,272 +7497,7 @@
       </p:grpSpPr>
       <p:sp>
         <p:nvSpPr>
-          <p:cNvPr id="84" name="Google Shape;84;p18"/>
-          <p:cNvSpPr txBox="1"/>
-          <p:nvPr>
-            <p:ph type="title"/>
-          </p:nvPr>
-        </p:nvSpPr>
-        <p:spPr>
-          <a:xfrm>
-            <a:off x="311700" y="445025"/>
-            <a:ext cx="8520600" cy="572700"/>
-          </a:xfrm>
-          <a:prstGeom prst="rect">
-            <a:avLst/>
-          </a:prstGeom>
-        </p:spPr>
-        <p:txBody>
-          <a:bodyPr anchorCtr="0" anchor="t" bIns="91425" lIns="91425" spcFirstLastPara="1" rIns="91425" wrap="square" tIns="91425">
-            <a:normAutofit/>
-          </a:bodyPr>
-          <a:lstStyle/>
-          <a:p>
-            <a:pPr indent="0" lvl="0" marL="0" rtl="0" algn="l">
-              <a:lnSpc>
-                <a:spcPct val="115000"/>
-              </a:lnSpc>
-              <a:spcBef>
-                <a:spcPts val="0"/>
-              </a:spcBef>
-              <a:spcAft>
-                <a:spcPts val="1200"/>
-              </a:spcAft>
-              <a:buNone/>
-            </a:pPr>
-            <a:r>
-              <a:rPr lang="en" sz="1800">
-                <a:solidFill>
-                  <a:schemeClr val="dk2"/>
-                </a:solidFill>
-              </a:rPr>
-              <a:t>[Pros and Cons]</a:t>
-            </a:r>
-            <a:endParaRPr sz="1800">
-              <a:solidFill>
-                <a:schemeClr val="dk2"/>
-              </a:solidFill>
-            </a:endParaRPr>
-          </a:p>
-        </p:txBody>
-      </p:sp>
-      <p:sp>
-        <p:nvSpPr>
           <p:cNvPr id="85" name="Google Shape;85;p18"/>
-          <p:cNvSpPr txBox="1"/>
-          <p:nvPr>
-            <p:ph idx="1" type="body"/>
-          </p:nvPr>
-        </p:nvSpPr>
-        <p:spPr>
-          <a:xfrm>
-            <a:off x="311700" y="1152475"/>
-            <a:ext cx="8520600" cy="3416400"/>
-          </a:xfrm>
-          <a:prstGeom prst="rect">
-            <a:avLst/>
-          </a:prstGeom>
-        </p:spPr>
-        <p:txBody>
-          <a:bodyPr anchorCtr="0" anchor="t" bIns="91425" lIns="91425" spcFirstLastPara="1" rIns="91425" wrap="square" tIns="91425">
-            <a:normAutofit fontScale="62500" lnSpcReduction="20000"/>
-          </a:bodyPr>
-          <a:lstStyle/>
-          <a:p>
-            <a:pPr indent="0" lvl="0" marL="0" rtl="0" algn="l">
-              <a:spcBef>
-                <a:spcPts val="0"/>
-              </a:spcBef>
-              <a:spcAft>
-                <a:spcPts val="0"/>
-              </a:spcAft>
-              <a:buNone/>
-            </a:pPr>
-            <a:r>
-              <a:rPr lang="en"/>
-              <a:t>**Selenium WebDriver:**</a:t>
-            </a:r>
-            <a:br>
-              <a:rPr lang="en"/>
-            </a:br>
-            <a:r>
-              <a:rPr lang="en"/>
-              <a:t>*Pros: Cross-browser compatibility, broad language support.*</a:t>
-            </a:r>
-            <a:br>
-              <a:rPr lang="en"/>
-            </a:br>
-            <a:r>
-              <a:rPr lang="en"/>
-              <a:t>*Cons: Learning curve for beginners, occasional browser updates affecting stability.*</a:t>
-            </a:r>
-            <a:endParaRPr/>
-          </a:p>
-          <a:p>
-            <a:pPr indent="0" lvl="0" marL="0" rtl="0" algn="l">
-              <a:spcBef>
-                <a:spcPts val="1200"/>
-              </a:spcBef>
-              <a:spcAft>
-                <a:spcPts val="0"/>
-              </a:spcAft>
-              <a:buClr>
-                <a:schemeClr val="dk1"/>
-              </a:buClr>
-              <a:buSzPct val="61111"/>
-              <a:buFont typeface="Arial"/>
-              <a:buNone/>
-            </a:pPr>
-            <a:r>
-              <a:rPr lang="en"/>
-              <a:t>**Ruby:**</a:t>
-            </a:r>
-            <a:br>
-              <a:rPr lang="en"/>
-            </a:br>
-            <a:r>
-              <a:rPr lang="en"/>
-              <a:t>*Pros: Readable syntax, extensive community support.*</a:t>
-            </a:r>
-            <a:br>
-              <a:rPr lang="en"/>
-            </a:br>
-            <a:r>
-              <a:rPr lang="en"/>
-              <a:t>*Cons: Slower execution speed compared to some languages.*</a:t>
-            </a:r>
-            <a:endParaRPr/>
-          </a:p>
-          <a:p>
-            <a:pPr indent="0" lvl="0" marL="0" rtl="0" algn="l">
-              <a:spcBef>
-                <a:spcPts val="1200"/>
-              </a:spcBef>
-              <a:spcAft>
-                <a:spcPts val="0"/>
-              </a:spcAft>
-              <a:buClr>
-                <a:schemeClr val="dk1"/>
-              </a:buClr>
-              <a:buSzPct val="61111"/>
-              <a:buFont typeface="Arial"/>
-              <a:buNone/>
-            </a:pPr>
-            <a:r>
-              <a:rPr lang="en"/>
-              <a:t>**Rake:**</a:t>
-            </a:r>
-            <a:br>
-              <a:rPr lang="en"/>
-            </a:br>
-            <a:r>
-              <a:rPr lang="en"/>
-              <a:t>*Pros: Simplifies task automation, integrates seamlessly with Ruby.*</a:t>
-            </a:r>
-            <a:br>
-              <a:rPr lang="en"/>
-            </a:br>
-            <a:r>
-              <a:rPr lang="en"/>
-              <a:t>*Cons: Limited parallel execution capabilities.*</a:t>
-            </a:r>
-            <a:endParaRPr/>
-          </a:p>
-          <a:p>
-            <a:pPr indent="0" lvl="0" marL="0" rtl="0" algn="l">
-              <a:spcBef>
-                <a:spcPts val="1200"/>
-              </a:spcBef>
-              <a:spcAft>
-                <a:spcPts val="0"/>
-              </a:spcAft>
-              <a:buClr>
-                <a:schemeClr val="dk1"/>
-              </a:buClr>
-              <a:buSzPct val="61111"/>
-              <a:buFont typeface="Arial"/>
-              <a:buNone/>
-            </a:pPr>
-            <a:r>
-              <a:rPr lang="en"/>
-              <a:t>**Minitest:**</a:t>
-            </a:r>
-            <a:br>
-              <a:rPr lang="en"/>
-            </a:br>
-            <a:r>
-              <a:rPr lang="en"/>
-              <a:t>*Pros: Lightweight, easy to set up, integrates well with Ruby.*</a:t>
-            </a:r>
-            <a:br>
-              <a:rPr lang="en"/>
-            </a:br>
-            <a:r>
-              <a:rPr lang="en"/>
-              <a:t>*Cons: Limited features compared to some other testing frameworks.*</a:t>
-            </a:r>
-            <a:endParaRPr/>
-          </a:p>
-          <a:p>
-            <a:pPr indent="0" lvl="0" marL="0" rtl="0" algn="l">
-              <a:spcBef>
-                <a:spcPts val="1200"/>
-              </a:spcBef>
-              <a:spcAft>
-                <a:spcPts val="1200"/>
-              </a:spcAft>
-              <a:buNone/>
-            </a:pPr>
-            <a:r>
-              <a:rPr lang="en"/>
-              <a:t>**Minitest-Reporters:**</a:t>
-            </a:r>
-            <a:br>
-              <a:rPr lang="en"/>
-            </a:br>
-            <a:r>
-              <a:rPr lang="en"/>
-              <a:t>*Pros: Detailed reports, customizable.*</a:t>
-            </a:r>
-            <a:br>
-              <a:rPr lang="en"/>
-            </a:br>
-            <a:r>
-              <a:rPr lang="en"/>
-              <a:t>*Cons: Limited formatting options.*</a:t>
-            </a:r>
-            <a:endParaRPr/>
-          </a:p>
-        </p:txBody>
-      </p:sp>
-    </p:spTree>
-  </p:cSld>
-  <p:clrMapOvr>
-    <a:masterClrMapping/>
-  </p:clrMapOvr>
-</p:sld>
-</file>
-
-<file path=ppt/slides/slide7.xml><?xml version="1.0" encoding="utf-8"?>
-<p:sld xmlns:a="http://schemas.openxmlformats.org/drawingml/2006/main" xmlns:r="http://schemas.openxmlformats.org/officeDocument/2006/relationships" xmlns:mc="http://schemas.openxmlformats.org/markup-compatibility/2006" xmlns:mv="urn:schemas-microsoft-com:mac:vml" xmlns:p="http://schemas.openxmlformats.org/presentationml/2006/main" xmlns:c="http://schemas.openxmlformats.org/drawingml/2006/chart" xmlns:dgm="http://schemas.openxmlformats.org/drawingml/2006/diagram" xmlns:o="urn:schemas-microsoft-com:office:office" xmlns:v="urn:schemas-microsoft-com:vml" xmlns:pvml="urn:schemas-microsoft-com:office:powerpoint" xmlns:com="http://schemas.openxmlformats.org/drawingml/2006/compatibility" xmlns:p14="http://schemas.microsoft.com/office/powerpoint/2010/main" xmlns:p15="http://schemas.microsoft.com/office/powerpoint/2012/main" xmlns:ahyp="http://schemas.microsoft.com/office/drawing/2018/hyperlinkcolor">
-  <p:cSld>
-    <p:spTree>
-      <p:nvGrpSpPr>
-        <p:cNvPr id="89" name="Shape 89"/>
-        <p:cNvGrpSpPr/>
-        <p:nvPr/>
-      </p:nvGrpSpPr>
-      <p:grpSpPr>
-        <a:xfrm>
-          <a:off x="0" y="0"/>
-          <a:ext cx="0" cy="0"/>
-          <a:chOff x="0" y="0"/>
-          <a:chExt cx="0" cy="0"/>
-        </a:xfrm>
-      </p:grpSpPr>
-      <p:sp>
-        <p:nvSpPr>
-          <p:cNvPr id="90" name="Google Shape;90;p19"/>
           <p:cNvSpPr txBox="1"/>
           <p:nvPr>
             <p:ph type="title"/>
@@ -9112,42 +7534,7 @@
             </a:pPr>
             <a:r>
               <a:rPr lang="en"/>
-              <a:t>[Tools and Libraries Overview]</a:t>
-            </a:r>
-            <a:endParaRPr/>
-          </a:p>
-          <a:p>
-            <a:pPr indent="0" lvl="0" marL="0" rtl="0" algn="l">
-              <a:spcBef>
-                <a:spcPts val="0"/>
-              </a:spcBef>
-              <a:spcAft>
-                <a:spcPts val="0"/>
-              </a:spcAft>
-              <a:buClr>
-                <a:schemeClr val="dk1"/>
-              </a:buClr>
-              <a:buSzPct val="39285"/>
-              <a:buFont typeface="Arial"/>
-              <a:buNone/>
-            </a:pPr>
-            <a:r>
-              <a:t/>
-            </a:r>
-            <a:endParaRPr/>
-          </a:p>
-          <a:p>
-            <a:pPr indent="0" lvl="0" marL="0" rtl="0" algn="l">
-              <a:spcBef>
-                <a:spcPts val="0"/>
-              </a:spcBef>
-              <a:spcAft>
-                <a:spcPts val="0"/>
-              </a:spcAft>
-              <a:buNone/>
-            </a:pPr>
-            <a:r>
-              <a:t/>
+              <a:t>[Inspirational Anecdote]</a:t>
             </a:r>
             <a:endParaRPr/>
           </a:p>
@@ -9155,7 +7542,7 @@
       </p:sp>
       <p:sp>
         <p:nvSpPr>
-          <p:cNvPr id="91" name="Google Shape;91;p19"/>
+          <p:cNvPr id="86" name="Google Shape;86;p18"/>
           <p:cNvSpPr txBox="1"/>
           <p:nvPr>
             <p:ph idx="1" type="body"/>
@@ -9172,7 +7559,7 @@
         </p:spPr>
         <p:txBody>
           <a:bodyPr anchorCtr="0" anchor="t" bIns="91425" lIns="91425" spcFirstLastPara="1" rIns="91425" wrap="square" tIns="91425">
-            <a:normAutofit fontScale="62500" lnSpcReduction="20000"/>
+            <a:normAutofit/>
           </a:bodyPr>
           <a:lstStyle/>
           <a:p>
@@ -9181,175 +7568,18 @@
                 <a:spcPts val="0"/>
               </a:spcBef>
               <a:spcAft>
-                <a:spcPts val="0"/>
+                <a:spcPts val="1200"/>
               </a:spcAft>
               <a:buClr>
                 <a:schemeClr val="dk1"/>
               </a:buClr>
-              <a:buSzPct val="61111"/>
+              <a:buSzPts val="1100"/>
               <a:buFont typeface="Arial"/>
               <a:buNone/>
             </a:pPr>
             <a:r>
               <a:rPr lang="en"/>
-              <a:t>1. **Selenium WebDriver:**    - *Purpose:* Enables automated testing of web applications by interacting with browser elements.</a:t>
-            </a:r>
-            <a:br>
-              <a:rPr lang="en"/>
-            </a:br>
-            <a:r>
-              <a:rPr lang="en"/>
-              <a:t>   - *Pros:* Cross-browser compatibility, support for multiple programming languages.</a:t>
-            </a:r>
-            <a:br>
-              <a:rPr lang="en"/>
-            </a:br>
-            <a:r>
-              <a:rPr lang="en"/>
-              <a:t>   - *Cons:* Requires a good understanding of web technologies.</a:t>
-            </a:r>
-            <a:endParaRPr/>
-          </a:p>
-          <a:p>
-            <a:pPr indent="0" lvl="0" marL="0" rtl="0" algn="l">
-              <a:spcBef>
-                <a:spcPts val="1200"/>
-              </a:spcBef>
-              <a:spcAft>
-                <a:spcPts val="0"/>
-              </a:spcAft>
-              <a:buClr>
-                <a:schemeClr val="dk1"/>
-              </a:buClr>
-              <a:buSzPct val="61111"/>
-              <a:buFont typeface="Arial"/>
-              <a:buNone/>
-            </a:pPr>
-            <a:r>
-              <a:rPr lang="en"/>
-              <a:t>2. **Ruby:**    - *Purpose:* Serves as the programming language for our project, offering readability and flexibility.</a:t>
-            </a:r>
-            <a:br>
-              <a:rPr lang="en"/>
-            </a:br>
-            <a:r>
-              <a:rPr lang="en"/>
-              <a:t>   - *Pros:* Elegant syntax, extensive library support.</a:t>
-            </a:r>
-            <a:br>
-              <a:rPr lang="en"/>
-            </a:br>
-            <a:r>
-              <a:rPr lang="en"/>
-              <a:t>   - *Cons:* Learning curve for beginners.</a:t>
-            </a:r>
-            <a:endParaRPr/>
-          </a:p>
-          <a:p>
-            <a:pPr indent="0" lvl="0" marL="0" rtl="0" algn="l">
-              <a:spcBef>
-                <a:spcPts val="1200"/>
-              </a:spcBef>
-              <a:spcAft>
-                <a:spcPts val="0"/>
-              </a:spcAft>
-              <a:buClr>
-                <a:schemeClr val="dk1"/>
-              </a:buClr>
-              <a:buSzPct val="61111"/>
-              <a:buFont typeface="Arial"/>
-              <a:buNone/>
-            </a:pPr>
-            <a:r>
-              <a:rPr lang="en"/>
-              <a:t>3. **Rake:**    - *Purpose:* Automation tool that simplifies the execution of tasks, such as running tests.</a:t>
-            </a:r>
-            <a:br>
-              <a:rPr lang="en"/>
-            </a:br>
-            <a:r>
-              <a:rPr lang="en"/>
-              <a:t>   - *Role:* Orchestrates the test tasks efficiently.</a:t>
-            </a:r>
-            <a:br>
-              <a:rPr lang="en"/>
-            </a:br>
-            <a:r>
-              <a:rPr lang="en"/>
-              <a:t>   - *Usage:* Defined</a:t>
-            </a:r>
-            <a:r>
-              <a:rPr lang="en"/>
-              <a:t> </a:t>
-            </a:r>
-            <a:r>
-              <a:rPr lang="en"/>
-              <a:t>in the Rakefile, facilitating easy execution of test suites.</a:t>
-            </a:r>
-            <a:endParaRPr/>
-          </a:p>
-          <a:p>
-            <a:pPr indent="0" lvl="0" marL="0" rtl="0" algn="l">
-              <a:spcBef>
-                <a:spcPts val="1200"/>
-              </a:spcBef>
-              <a:spcAft>
-                <a:spcPts val="0"/>
-              </a:spcAft>
-              <a:buClr>
-                <a:schemeClr val="dk1"/>
-              </a:buClr>
-              <a:buSzPct val="61111"/>
-              <a:buFont typeface="Arial"/>
-              <a:buNone/>
-            </a:pPr>
-            <a:r>
-              <a:rPr lang="en"/>
-              <a:t>4. **Minitest:**    - *Purpose:* Lightweight testing framework for Ruby.</a:t>
-            </a:r>
-            <a:br>
-              <a:rPr lang="en"/>
-            </a:br>
-            <a:r>
-              <a:rPr lang="en"/>
-              <a:t>   - *Pros:* Simplicity, quick setup, and execution.</a:t>
-            </a:r>
-            <a:br>
-              <a:rPr lang="en"/>
-            </a:br>
-            <a:r>
-              <a:rPr lang="en"/>
-              <a:t>   - *Cons:* Limited built-in assertions.</a:t>
-            </a:r>
-            <a:endParaRPr/>
-          </a:p>
-          <a:p>
-            <a:pPr indent="0" lvl="0" marL="0" rtl="0" algn="l">
-              <a:spcBef>
-                <a:spcPts val="1200"/>
-              </a:spcBef>
-              <a:spcAft>
-                <a:spcPts val="1200"/>
-              </a:spcAft>
-              <a:buNone/>
-            </a:pPr>
-            <a:r>
-              <a:rPr lang="en"/>
-              <a:t>5. **Minitest-Reporters:**    - *Purpose:* Enhances test reporting with various formats, such as HTML.</a:t>
-            </a:r>
-            <a:br>
-              <a:rPr lang="en"/>
-            </a:br>
-            <a:r>
-              <a:rPr lang="en"/>
-              <a:t>   - *Pros:* Improved test result visualization.</a:t>
-            </a:r>
-            <a:br>
-              <a:rPr lang="en"/>
-            </a:br>
-            <a:r>
-              <a:rPr lang="en"/>
-              <a:t>   - *Cons:* Additional dependency.</a:t>
+              <a:t>Remember, in the world of automation, every line of code you write is a step toward a more efficient and reliable testing process. Embrace the power of automation, and let your tests be the guardians of quality!</a:t>
             </a:r>
             <a:endParaRPr/>
           </a:p>
@@ -9363,12 +7593,12 @@
 </p:sld>
 </file>
 
-<file path=ppt/slides/slide8.xml><?xml version="1.0" encoding="utf-8"?>
+<file path=ppt/slides/slide7.xml><?xml version="1.0" encoding="utf-8"?>
 <p:sld xmlns:a="http://schemas.openxmlformats.org/drawingml/2006/main" xmlns:r="http://schemas.openxmlformats.org/officeDocument/2006/relationships" xmlns:mc="http://schemas.openxmlformats.org/markup-compatibility/2006" xmlns:mv="urn:schemas-microsoft-com:mac:vml" xmlns:p="http://schemas.openxmlformats.org/presentationml/2006/main" xmlns:c="http://schemas.openxmlformats.org/drawingml/2006/chart" xmlns:dgm="http://schemas.openxmlformats.org/drawingml/2006/diagram" xmlns:o="urn:schemas-microsoft-com:office:office" xmlns:v="urn:schemas-microsoft-com:vml" xmlns:pvml="urn:schemas-microsoft-com:office:powerpoint" xmlns:com="http://schemas.openxmlformats.org/drawingml/2006/compatibility" xmlns:p14="http://schemas.microsoft.com/office/powerpoint/2010/main" xmlns:p15="http://schemas.microsoft.com/office/powerpoint/2012/main" xmlns:ahyp="http://schemas.microsoft.com/office/drawing/2018/hyperlinkcolor">
   <p:cSld>
     <p:spTree>
       <p:nvGrpSpPr>
-        <p:cNvPr id="95" name="Shape 95"/>
+        <p:cNvPr id="90" name="Shape 90"/>
         <p:cNvGrpSpPr/>
         <p:nvPr/>
       </p:nvGrpSpPr>
@@ -9382,7 +7612,7 @@
       </p:grpSpPr>
       <p:sp>
         <p:nvSpPr>
-          <p:cNvPr id="96" name="Google Shape;96;p20"/>
+          <p:cNvPr id="91" name="Google Shape;91;p19"/>
           <p:cNvSpPr txBox="1"/>
           <p:nvPr>
             <p:ph type="title"/>
@@ -9414,7 +7644,7 @@
             </a:pPr>
             <a:r>
               <a:rPr lang="en"/>
-              <a:t>[Rake as an Automation Tool]</a:t>
+              <a:t>[Inspirational Anecdote]</a:t>
             </a:r>
             <a:endParaRPr/>
           </a:p>
@@ -9422,7 +7652,7 @@
       </p:sp>
       <p:sp>
         <p:nvSpPr>
-          <p:cNvPr id="97" name="Google Shape;97;p20"/>
+          <p:cNvPr id="92" name="Google Shape;92;p19"/>
           <p:cNvSpPr txBox="1"/>
           <p:nvPr>
             <p:ph idx="1" type="body"/>
@@ -9439,7 +7669,7 @@
         </p:spPr>
         <p:txBody>
           <a:bodyPr anchorCtr="0" anchor="t" bIns="91425" lIns="91425" spcFirstLastPara="1" rIns="91425" wrap="square" tIns="91425">
-            <a:normAutofit fontScale="92500" lnSpcReduction="10000"/>
+            <a:normAutofit/>
           </a:bodyPr>
           <a:lstStyle/>
           <a:p>
@@ -9448,61 +7678,22 @@
                 <a:spcPts val="0"/>
               </a:spcBef>
               <a:spcAft>
-                <a:spcPts val="0"/>
-              </a:spcAft>
+                <a:spcPts val="1200"/>
+              </a:spcAft>
+              <a:buClr>
+                <a:schemeClr val="dk1"/>
+              </a:buClr>
+              <a:buSzPts val="1100"/>
+              <a:buFont typeface="Arial"/>
               <a:buNone/>
             </a:pPr>
             <a:r>
               <a:rPr lang="en"/>
-              <a:t>"Now, let's talk about Rake. This powerful automation tool simplifies our tasks, making it a crucial element in our testing process. Rake allows us to define, organize, and execute tasks efficiently, enhancing our automation capabilities."</a:t>
+              <a:t>So far it feels like test </a:t>
             </a:r>
-            <a:endParaRPr/>
-          </a:p>
-          <a:p>
-            <a:pPr indent="0" lvl="0" marL="0" rtl="0" algn="l">
-              <a:spcBef>
-                <a:spcPts val="1200"/>
-              </a:spcBef>
-              <a:spcAft>
-                <a:spcPts val="0"/>
-              </a:spcAft>
-              <a:buNone/>
-            </a:pPr>
             <a:r>
               <a:rPr lang="en"/>
-              <a:t>"Rake, the unsung hero of automation, simplifies and streamlines our testing tasks. It allows us to define, organize, and execute tasks with ease. In our case, it effortlessly manages our test suite, making automation a breeze."</a:t>
-            </a:r>
-            <a:endParaRPr/>
-          </a:p>
-          <a:p>
-            <a:pPr indent="0" lvl="0" marL="0" rtl="0" algn="l">
-              <a:spcBef>
-                <a:spcPts val="1200"/>
-              </a:spcBef>
-              <a:spcAft>
-                <a:spcPts val="0"/>
-              </a:spcAft>
-              <a:buNone/>
-            </a:pPr>
-            <a:r>
-              <a:rPr lang="en"/>
-              <a:t>[Role of Rake]</a:t>
-            </a:r>
-            <a:endParaRPr/>
-          </a:p>
-          <a:p>
-            <a:pPr indent="0" lvl="0" marL="0" rtl="0" algn="l">
-              <a:spcBef>
-                <a:spcPts val="1200"/>
-              </a:spcBef>
-              <a:spcAft>
-                <a:spcPts val="1200"/>
-              </a:spcAft>
-              <a:buNone/>
-            </a:pPr>
-            <a:r>
-              <a:rPr lang="en"/>
-              <a:t>"Rake plays a crucial role as our automation tool, simplifying complex tasks and providing an organized structure. In the Rakefile, we define tasks, and by running 'rake test,' we effortlessly execute our test suites defined in the 'test/specs' directory."</a:t>
+              <a:t>automation is not just about saving time—it's about empowering developers and testers to focus on creativity and innovation. Yeah, leave the grunt work for the automation framework while you create awesome web apps.</a:t>
             </a:r>
             <a:endParaRPr/>
           </a:p>
@@ -9516,12 +7707,12 @@
 </p:sld>
 </file>
 
-<file path=ppt/slides/slide9.xml><?xml version="1.0" encoding="utf-8"?>
+<file path=ppt/slides/slide8.xml><?xml version="1.0" encoding="utf-8"?>
 <p:sld xmlns:a="http://schemas.openxmlformats.org/drawingml/2006/main" xmlns:r="http://schemas.openxmlformats.org/officeDocument/2006/relationships" xmlns:mc="http://schemas.openxmlformats.org/markup-compatibility/2006" xmlns:mv="urn:schemas-microsoft-com:mac:vml" xmlns:p="http://schemas.openxmlformats.org/presentationml/2006/main" xmlns:c="http://schemas.openxmlformats.org/drawingml/2006/chart" xmlns:dgm="http://schemas.openxmlformats.org/drawingml/2006/diagram" xmlns:o="urn:schemas-microsoft-com:office:office" xmlns:v="urn:schemas-microsoft-com:vml" xmlns:pvml="urn:schemas-microsoft-com:office:powerpoint" xmlns:com="http://schemas.openxmlformats.org/drawingml/2006/compatibility" xmlns:p14="http://schemas.microsoft.com/office/powerpoint/2010/main" xmlns:p15="http://schemas.microsoft.com/office/powerpoint/2012/main" xmlns:ahyp="http://schemas.microsoft.com/office/drawing/2018/hyperlinkcolor">
   <p:cSld>
     <p:spTree>
       <p:nvGrpSpPr>
-        <p:cNvPr id="101" name="Shape 101"/>
+        <p:cNvPr id="96" name="Shape 96"/>
         <p:cNvGrpSpPr/>
         <p:nvPr/>
       </p:nvGrpSpPr>
@@ -9535,7 +7726,7 @@
       </p:grpSpPr>
       <p:sp>
         <p:nvSpPr>
-          <p:cNvPr id="102" name="Google Shape;102;p21"/>
+          <p:cNvPr id="97" name="Google Shape;97;p20"/>
           <p:cNvSpPr txBox="1"/>
           <p:nvPr>
             <p:ph type="title"/>
@@ -9567,7 +7758,7 @@
             </a:pPr>
             <a:r>
               <a:rPr lang="en"/>
-              <a:t>[Code Files Overview]</a:t>
+              <a:t>[Humorous Quips]</a:t>
             </a:r>
             <a:endParaRPr/>
           </a:p>
@@ -9575,7 +7766,7 @@
       </p:sp>
       <p:sp>
         <p:nvSpPr>
-          <p:cNvPr id="103" name="Google Shape;103;p21"/>
+          <p:cNvPr id="98" name="Google Shape;98;p20"/>
           <p:cNvSpPr txBox="1"/>
           <p:nvPr>
             <p:ph idx="1" type="body"/>
@@ -9592,142 +7783,132 @@
         </p:spPr>
         <p:txBody>
           <a:bodyPr anchorCtr="0" anchor="t" bIns="91425" lIns="91425" spcFirstLastPara="1" rIns="91425" wrap="square" tIns="91425">
-            <a:normAutofit fontScale="77500" lnSpcReduction="20000"/>
+            <a:normAutofit/>
           </a:bodyPr>
           <a:lstStyle/>
           <a:p>
-            <a:pPr indent="-317182" lvl="0" marL="457200" rtl="0" algn="l">
-              <a:spcBef>
-                <a:spcPts val="0"/>
-              </a:spcBef>
-              <a:spcAft>
-                <a:spcPts val="0"/>
-              </a:spcAft>
-              <a:buSzPct val="100000"/>
-              <a:buChar char="●"/>
+            <a:pPr indent="0" lvl="0" marL="0" rtl="0" algn="l">
+              <a:spcBef>
+                <a:spcPts val="0"/>
+              </a:spcBef>
+              <a:spcAft>
+                <a:spcPts val="1200"/>
+              </a:spcAft>
+              <a:buNone/>
             </a:pPr>
             <a:r>
               <a:rPr lang="en"/>
-              <a:t>"Let's take a peek into our code files to understand how everything comes together."</a:t>
+              <a:t>Why do programmers prefer automation? Because it's the only time they enjoy watching something work on repeat without errors!</a:t>
             </a:r>
             <a:endParaRPr/>
           </a:p>
+        </p:txBody>
+      </p:sp>
+    </p:spTree>
+  </p:cSld>
+  <p:clrMapOvr>
+    <a:masterClrMapping/>
+  </p:clrMapOvr>
+</p:sld>
+</file>
+
+<file path=ppt/slides/slide9.xml><?xml version="1.0" encoding="utf-8"?>
+<p:sld xmlns:a="http://schemas.openxmlformats.org/drawingml/2006/main" xmlns:r="http://schemas.openxmlformats.org/officeDocument/2006/relationships" xmlns:mc="http://schemas.openxmlformats.org/markup-compatibility/2006" xmlns:mv="urn:schemas-microsoft-com:mac:vml" xmlns:p="http://schemas.openxmlformats.org/presentationml/2006/main" xmlns:c="http://schemas.openxmlformats.org/drawingml/2006/chart" xmlns:dgm="http://schemas.openxmlformats.org/drawingml/2006/diagram" xmlns:o="urn:schemas-microsoft-com:office:office" xmlns:v="urn:schemas-microsoft-com:vml" xmlns:pvml="urn:schemas-microsoft-com:office:powerpoint" xmlns:com="http://schemas.openxmlformats.org/drawingml/2006/compatibility" xmlns:p14="http://schemas.microsoft.com/office/powerpoint/2010/main" xmlns:p15="http://schemas.microsoft.com/office/powerpoint/2012/main" xmlns:ahyp="http://schemas.microsoft.com/office/drawing/2018/hyperlinkcolor">
+  <p:cSld>
+    <p:spTree>
+      <p:nvGrpSpPr>
+        <p:cNvPr id="102" name="Shape 102"/>
+        <p:cNvGrpSpPr/>
+        <p:nvPr/>
+      </p:nvGrpSpPr>
+      <p:grpSpPr>
+        <a:xfrm>
+          <a:off x="0" y="0"/>
+          <a:ext cx="0" cy="0"/>
+          <a:chOff x="0" y="0"/>
+          <a:chExt cx="0" cy="0"/>
+        </a:xfrm>
+      </p:grpSpPr>
+      <p:sp>
+        <p:nvSpPr>
+          <p:cNvPr id="103" name="Google Shape;103;p21"/>
+          <p:cNvSpPr txBox="1"/>
+          <p:nvPr>
+            <p:ph type="title"/>
+          </p:nvPr>
+        </p:nvSpPr>
+        <p:spPr>
+          <a:xfrm>
+            <a:off x="311700" y="445025"/>
+            <a:ext cx="8520600" cy="572700"/>
+          </a:xfrm>
+          <a:prstGeom prst="rect">
+            <a:avLst/>
+          </a:prstGeom>
+        </p:spPr>
+        <p:txBody>
+          <a:bodyPr anchorCtr="0" anchor="t" bIns="91425" lIns="91425" spcFirstLastPara="1" rIns="91425" wrap="square" tIns="91425">
+            <a:normAutofit fontScale="90000"/>
+          </a:bodyPr>
+          <a:lstStyle/>
           <a:p>
-            <a:pPr indent="-317182" lvl="0" marL="457200" rtl="0" algn="l">
-              <a:spcBef>
-                <a:spcPts val="0"/>
-              </a:spcBef>
-              <a:spcAft>
-                <a:spcPts val="0"/>
-              </a:spcAft>
-              <a:buSzPct val="100000"/>
-              <a:buChar char="●"/>
+            <a:pPr indent="0" lvl="0" marL="0" rtl="0" algn="l">
+              <a:spcBef>
+                <a:spcPts val="0"/>
+              </a:spcBef>
+              <a:spcAft>
+                <a:spcPts val="0"/>
+              </a:spcAft>
+              <a:buNone/>
             </a:pPr>
             <a:r>
               <a:rPr lang="en"/>
-              <a:t>"Starting with the `README.md`, it provides easy steps for setup and execution. Remember to check your Ruby installation and run 'bundle install' to get started."</a:t>
+              <a:t>[Humorous Quips]</a:t>
             </a:r>
             <a:endParaRPr/>
           </a:p>
+        </p:txBody>
+      </p:sp>
+      <p:sp>
+        <p:nvSpPr>
+          <p:cNvPr id="104" name="Google Shape;104;p21"/>
+          <p:cNvSpPr txBox="1"/>
+          <p:nvPr>
+            <p:ph idx="1" type="body"/>
+          </p:nvPr>
+        </p:nvSpPr>
+        <p:spPr>
+          <a:xfrm>
+            <a:off x="311700" y="1152475"/>
+            <a:ext cx="8520600" cy="3416400"/>
+          </a:xfrm>
+          <a:prstGeom prst="rect">
+            <a:avLst/>
+          </a:prstGeom>
+        </p:spPr>
+        <p:txBody>
+          <a:bodyPr anchorCtr="0" anchor="t" bIns="91425" lIns="91425" spcFirstLastPara="1" rIns="91425" wrap="square" tIns="91425">
+            <a:normAutofit/>
+          </a:bodyPr>
+          <a:lstStyle/>
           <a:p>
-            <a:pPr indent="-317182" lvl="0" marL="457200" rtl="0" algn="l">
-              <a:spcBef>
-                <a:spcPts val="0"/>
-              </a:spcBef>
-              <a:spcAft>
-                <a:spcPts val="0"/>
-              </a:spcAft>
-              <a:buSzPct val="100000"/>
-              <a:buChar char="●"/>
+            <a:pPr indent="0" lvl="0" marL="0" rtl="0" algn="l">
+              <a:spcBef>
+                <a:spcPts val="0"/>
+              </a:spcBef>
+              <a:spcAft>
+                <a:spcPts val="1200"/>
+              </a:spcAft>
+              <a:buClr>
+                <a:schemeClr val="dk1"/>
+              </a:buClr>
+              <a:buSzPts val="1100"/>
+              <a:buFont typeface="Arial"/>
+              <a:buNone/>
             </a:pPr>
             <a:r>
               <a:rPr lang="en"/>
-              <a:t>"Next up, our `Rakefile`. This file defines our default task as running tests. It's the conductor orchestrating our test suite."</a:t>
-            </a:r>
-            <a:endParaRPr/>
-          </a:p>
-          <a:p>
-            <a:pPr indent="-317182" lvl="0" marL="457200" rtl="0" algn="l">
-              <a:spcBef>
-                <a:spcPts val="0"/>
-              </a:spcBef>
-              <a:spcAft>
-                <a:spcPts val="0"/>
-              </a:spcAft>
-              <a:buSzPct val="100000"/>
-              <a:buChar char="●"/>
-            </a:pPr>
-            <a:r>
-              <a:rPr lang="en"/>
-              <a:t>"The `GemFile` lists our essential gems – Selenium WebDriver, Minitest, Minitest-Reporters, and Rake. These gems form the foundation of our project."</a:t>
-            </a:r>
-            <a:endParaRPr/>
-          </a:p>
-          <a:p>
-            <a:pPr indent="-317182" lvl="0" marL="457200" rtl="0" algn="l">
-              <a:spcBef>
-                <a:spcPts val="0"/>
-              </a:spcBef>
-              <a:spcAft>
-                <a:spcPts val="0"/>
-              </a:spcAft>
-              <a:buSzPct val="100000"/>
-              <a:buChar char="●"/>
-            </a:pPr>
-            <a:r>
-              <a:rPr lang="en"/>
-              <a:t>"Moving on to `test/test_helper.rb`, it configures Minitest to use the HTML reporter, enhancing our test reporting capabilities."</a:t>
-            </a:r>
-            <a:endParaRPr/>
-          </a:p>
-          <a:p>
-            <a:pPr indent="-317182" lvl="0" marL="457200" rtl="0" algn="l">
-              <a:spcBef>
-                <a:spcPts val="0"/>
-              </a:spcBef>
-              <a:spcAft>
-                <a:spcPts val="0"/>
-              </a:spcAft>
-              <a:buSzPct val="100000"/>
-              <a:buChar char="●"/>
-            </a:pPr>
-            <a:r>
-              <a:rPr lang="en"/>
-              <a:t>"In `test/helpers/webdriver_helper.rb`, we initialize our Selenium WebDriver, customizing it for a smooth testing experience."</a:t>
-            </a:r>
-            <a:endParaRPr/>
-          </a:p>
-          <a:p>
-            <a:pPr indent="-317182" lvl="0" marL="457200" rtl="0" algn="l">
-              <a:spcBef>
-                <a:spcPts val="0"/>
-              </a:spcBef>
-              <a:spcAft>
-                <a:spcPts val="0"/>
-              </a:spcAft>
-              <a:buSzPct val="100000"/>
-              <a:buChar char="●"/>
-            </a:pPr>
-            <a:r>
-              <a:rPr lang="en"/>
-              <a:t>"And finally, our test scripts. For instance, in `checkboxes_test.rb`, we automate toggling checkboxes, ensuring our application behaves as expected."</a:t>
-            </a:r>
-            <a:endParaRPr/>
-          </a:p>
-          <a:p>
-            <a:pPr indent="-317182" lvl="0" marL="457200" rtl="0" algn="l">
-              <a:spcBef>
-                <a:spcPts val="0"/>
-              </a:spcBef>
-              <a:spcAft>
-                <a:spcPts val="0"/>
-              </a:spcAft>
-              <a:buSzPct val="100000"/>
-              <a:buChar char="●"/>
-            </a:pPr>
-            <a:r>
-              <a:rPr lang="en"/>
-              <a:t>"Similarly, in `disappearing_elements_test.rb`, we tackle the challenge of disappearing elements, checking if the page refreshes properly."</a:t>
+              <a:t>Automation: where robots do the heavy lifting, and we get to enjoy our coffee a bit longer! Who said testing can't have a sense of humor? Cheers to error-free code and automated success!</a:t>
             </a:r>
             <a:endParaRPr/>
           </a:p>

</xml_diff>